<commit_message>
Adjust fonts in main powerpoint file
- Headings are 44 bold
- Body is 24
- The user testing metric slide could not go higher than 18 in the grid
</commit_message>
<xml_diff>
--- a/Screencast_PowerPoint.pptx
+++ b/Screencast_PowerPoint.pptx
@@ -128,6 +128,11 @@
       </a:defRPr>
     </a:lvl9pPr>
   </p:defaultTextStyle>
+  <p:extLst>
+    <p:ext uri="{EFAFB233-063F-42B5-8137-9DF3F51BA10A}">
+      <p15:sldGuideLst xmlns:p15="http://schemas.microsoft.com/office/powerpoint/2012/main"/>
+    </p:ext>
+  </p:extLst>
 </p:presentation>
 </file>
 
@@ -3553,14 +3558,16 @@
         </p:nvSpPr>
         <p:spPr/>
         <p:txBody>
-          <a:bodyPr/>
-          <a:lstStyle/>
-          <a:p>
-            <a:r>
-              <a:rPr lang="en-GB" dirty="0" err="1"/>
+          <a:bodyPr>
+            <a:normAutofit/>
+          </a:bodyPr>
+          <a:lstStyle/>
+          <a:p>
+            <a:r>
+              <a:rPr lang="en-GB" sz="12500" dirty="0" err="1"/>
               <a:t>MediWatch</a:t>
             </a:r>
-            <a:endParaRPr lang="en-GB" dirty="0"/>
+            <a:endParaRPr lang="en-GB" sz="12500" dirty="0"/>
           </a:p>
         </p:txBody>
       </p:sp>
@@ -3593,7 +3600,7 @@
           <a:lstStyle/>
           <a:p>
             <a:r>
-              <a:rPr lang="en-GB" sz="1600" b="1" dirty="0">
+              <a:rPr lang="en-GB" sz="4400" b="1" dirty="0">
                 <a:solidFill>
                   <a:schemeClr val="tx1"/>
                 </a:solidFill>
@@ -3603,7 +3610,7 @@
           </a:p>
           <a:p>
             <a:r>
-              <a:rPr lang="en-GB" sz="1200" dirty="0">
+              <a:rPr lang="en-GB" sz="2000" dirty="0">
                 <a:solidFill>
                   <a:schemeClr val="tx1"/>
                 </a:solidFill>
@@ -3613,7 +3620,7 @@
           </a:p>
           <a:p>
             <a:r>
-              <a:rPr lang="en-GB" sz="1200" dirty="0">
+              <a:rPr lang="en-GB" sz="2000" dirty="0">
                 <a:solidFill>
                   <a:schemeClr val="tx1"/>
                 </a:solidFill>
@@ -3623,7 +3630,7 @@
           </a:p>
           <a:p>
             <a:r>
-              <a:rPr lang="en-GB" sz="1200" dirty="0">
+              <a:rPr lang="en-GB" sz="2000" dirty="0">
                 <a:solidFill>
                   <a:schemeClr val="tx1"/>
                 </a:solidFill>
@@ -3633,7 +3640,7 @@
           </a:p>
           <a:p>
             <a:r>
-              <a:rPr lang="en-GB" sz="1200" dirty="0">
+              <a:rPr lang="en-GB" sz="2000" dirty="0">
                 <a:solidFill>
                   <a:schemeClr val="tx1"/>
                 </a:solidFill>
@@ -3695,10 +3702,10 @@
           <a:lstStyle/>
           <a:p>
             <a:r>
-              <a:rPr lang="en-US" dirty="0"/>
+              <a:rPr lang="en-US" b="1" dirty="0"/>
               <a:t>User Interface</a:t>
             </a:r>
-            <a:endParaRPr lang="en-GB" dirty="0"/>
+            <a:endParaRPr lang="en-GB" b="1" dirty="0"/>
           </a:p>
         </p:txBody>
       </p:sp>
@@ -3787,8 +3794,8 @@
         </p:nvSpPr>
         <p:spPr>
           <a:xfrm>
-            <a:off x="838199" y="5397909"/>
-            <a:ext cx="4930567" cy="1200329"/>
+            <a:off x="838199" y="4919008"/>
+            <a:ext cx="4930567" cy="1938992"/>
           </a:xfrm>
           <a:prstGeom prst="rect">
             <a:avLst/>
@@ -3806,7 +3813,7 @@
               <a:buChar char="•"/>
             </a:pPr>
             <a:r>
-              <a:rPr lang="en-US" dirty="0"/>
+              <a:rPr lang="en-US" sz="2400" dirty="0"/>
               <a:t>Meets user’s mental model</a:t>
             </a:r>
           </a:p>
@@ -3816,7 +3823,7 @@
               <a:buChar char="•"/>
             </a:pPr>
             <a:r>
-              <a:rPr lang="en-US" dirty="0"/>
+              <a:rPr lang="en-US" sz="2400" dirty="0"/>
               <a:t>Represents each physical section</a:t>
             </a:r>
           </a:p>
@@ -3826,7 +3833,7 @@
               <a:buChar char="•"/>
             </a:pPr>
             <a:r>
-              <a:rPr lang="en-US" dirty="0"/>
+              <a:rPr lang="en-US" sz="2400" dirty="0"/>
               <a:t>Uncomplicated design</a:t>
             </a:r>
           </a:p>
@@ -3836,10 +3843,10 @@
               <a:buChar char="•"/>
             </a:pPr>
             <a:r>
-              <a:rPr lang="en-US" dirty="0"/>
+              <a:rPr lang="en-US" sz="2400" dirty="0"/>
               <a:t>Each box holds the day/time of upcoming doses</a:t>
             </a:r>
-            <a:endParaRPr lang="en-GB" dirty="0"/>
+            <a:endParaRPr lang="en-GB" sz="2400" dirty="0"/>
           </a:p>
         </p:txBody>
       </p:sp>
@@ -3857,8 +3864,8 @@
         </p:nvSpPr>
         <p:spPr>
           <a:xfrm>
-            <a:off x="6423235" y="5385046"/>
-            <a:ext cx="4930567" cy="923330"/>
+            <a:off x="6423235" y="4982813"/>
+            <a:ext cx="4930567" cy="1938992"/>
           </a:xfrm>
           <a:prstGeom prst="rect">
             <a:avLst/>
@@ -3876,7 +3883,7 @@
               <a:buChar char="•"/>
             </a:pPr>
             <a:r>
-              <a:rPr lang="en-US" dirty="0"/>
+              <a:rPr lang="en-US" sz="2400" dirty="0"/>
               <a:t>Selecting a box shows countdown to next dose</a:t>
             </a:r>
           </a:p>
@@ -3886,7 +3893,7 @@
               <a:buChar char="•"/>
             </a:pPr>
             <a:r>
-              <a:rPr lang="en-US" dirty="0"/>
+              <a:rPr lang="en-US" sz="2400" dirty="0"/>
               <a:t>Box highlighted in yellow for adequate contrast</a:t>
             </a:r>
           </a:p>
@@ -3896,10 +3903,10 @@
               <a:buChar char="•"/>
             </a:pPr>
             <a:r>
-              <a:rPr lang="en-US" dirty="0"/>
+              <a:rPr lang="en-US" sz="2400" dirty="0"/>
               <a:t>Borders of selection emboldened</a:t>
             </a:r>
-            <a:endParaRPr lang="en-GB" dirty="0"/>
+            <a:endParaRPr lang="en-GB" sz="2400" dirty="0"/>
           </a:p>
         </p:txBody>
       </p:sp>
@@ -3955,10 +3962,10 @@
           <a:lstStyle/>
           <a:p>
             <a:r>
-              <a:rPr lang="en-US" dirty="0"/>
+              <a:rPr lang="en-US" b="1" dirty="0"/>
               <a:t>User Interface</a:t>
             </a:r>
-            <a:endParaRPr lang="en-GB" dirty="0"/>
+            <a:endParaRPr lang="en-GB" b="1" dirty="0"/>
           </a:p>
         </p:txBody>
       </p:sp>
@@ -3976,8 +3983,8 @@
         </p:nvSpPr>
         <p:spPr>
           <a:xfrm>
-            <a:off x="838199" y="5397909"/>
-            <a:ext cx="4930567" cy="646331"/>
+            <a:off x="846436" y="4359078"/>
+            <a:ext cx="4930567" cy="1200329"/>
           </a:xfrm>
           <a:prstGeom prst="rect">
             <a:avLst/>
@@ -3995,7 +4002,7 @@
               <a:buChar char="•"/>
             </a:pPr>
             <a:r>
-              <a:rPr lang="en-US" dirty="0"/>
+              <a:rPr lang="en-US" sz="2400" dirty="0"/>
               <a:t>Arrow pointing to the box to be accessed</a:t>
             </a:r>
           </a:p>
@@ -4005,7 +4012,7 @@
               <a:buChar char="•"/>
             </a:pPr>
             <a:r>
-              <a:rPr lang="en-US" dirty="0"/>
+              <a:rPr lang="en-US" sz="2400" dirty="0"/>
               <a:t>Green box, matching the green LED</a:t>
             </a:r>
           </a:p>
@@ -4025,8 +4032,8 @@
         </p:nvSpPr>
         <p:spPr>
           <a:xfrm>
-            <a:off x="6423235" y="5385046"/>
-            <a:ext cx="4930567" cy="923330"/>
+            <a:off x="6423233" y="4359078"/>
+            <a:ext cx="4930567" cy="2308324"/>
           </a:xfrm>
           <a:prstGeom prst="rect">
             <a:avLst/>
@@ -4044,7 +4051,7 @@
               <a:buChar char="•"/>
             </a:pPr>
             <a:r>
-              <a:rPr lang="en-US" dirty="0"/>
+              <a:rPr lang="en-US" sz="2400" dirty="0"/>
               <a:t>Red box to alert user to dangerous action</a:t>
             </a:r>
           </a:p>
@@ -4054,7 +4061,7 @@
               <a:buChar char="•"/>
             </a:pPr>
             <a:r>
-              <a:rPr lang="en-US" dirty="0"/>
+              <a:rPr lang="en-US" sz="2400" dirty="0"/>
               <a:t>Large X is an extra indicator of user error</a:t>
             </a:r>
           </a:p>
@@ -4064,10 +4071,10 @@
               <a:buChar char="•"/>
             </a:pPr>
             <a:r>
-              <a:rPr lang="en-US" dirty="0"/>
+              <a:rPr lang="en-US" sz="2400" dirty="0"/>
               <a:t>Capital letters and ! draw attention to message</a:t>
             </a:r>
-            <a:endParaRPr lang="en-GB" dirty="0"/>
+            <a:endParaRPr lang="en-GB" sz="2400" dirty="0"/>
           </a:p>
         </p:txBody>
       </p:sp>
@@ -4189,7 +4196,7 @@
           <a:lstStyle/>
           <a:p>
             <a:r>
-              <a:rPr lang="en-IE" dirty="0"/>
+              <a:rPr lang="en-IE" b="1" dirty="0"/>
               <a:t>List of Hardware</a:t>
             </a:r>
           </a:p>
@@ -4213,35 +4220,37 @@
         </p:nvSpPr>
         <p:spPr/>
         <p:txBody>
-          <a:bodyPr/>
-          <a:lstStyle/>
-          <a:p>
-            <a:r>
-              <a:rPr lang="en-IE" dirty="0"/>
+          <a:bodyPr>
+            <a:normAutofit/>
+          </a:bodyPr>
+          <a:lstStyle/>
+          <a:p>
+            <a:r>
+              <a:rPr lang="en-IE" sz="2400" dirty="0"/>
               <a:t>Roller Lever Micro Switches</a:t>
             </a:r>
           </a:p>
           <a:p>
             <a:r>
-              <a:rPr lang="en-IE" dirty="0"/>
+              <a:rPr lang="en-IE" sz="2400" dirty="0"/>
               <a:t>Force-Sensitive Resistors</a:t>
             </a:r>
           </a:p>
           <a:p>
             <a:r>
-              <a:rPr lang="en-IE" dirty="0"/>
+              <a:rPr lang="en-IE" sz="2400" dirty="0"/>
               <a:t>Green and Red LEDs</a:t>
             </a:r>
           </a:p>
           <a:p>
             <a:r>
-              <a:rPr lang="en-IE" dirty="0"/>
+              <a:rPr lang="en-IE" sz="2400" dirty="0"/>
               <a:t>Resistors (220Ω and 330Ω)</a:t>
             </a:r>
           </a:p>
           <a:p>
             <a:r>
-              <a:rPr lang="en-IE" dirty="0"/>
+              <a:rPr lang="en-IE" sz="2400" dirty="0"/>
               <a:t>Female to Female Cables</a:t>
             </a:r>
           </a:p>
@@ -4299,7 +4308,7 @@
           <a:lstStyle/>
           <a:p>
             <a:r>
-              <a:rPr lang="en-IE" dirty="0"/>
+              <a:rPr lang="en-IE" b="1" dirty="0"/>
               <a:t>Fritzing Diagram</a:t>
             </a:r>
           </a:p>
@@ -4392,7 +4401,7 @@
           <a:lstStyle/>
           <a:p>
             <a:r>
-              <a:rPr lang="en-IE" dirty="0"/>
+              <a:rPr lang="en-IE" b="1" dirty="0"/>
               <a:t>Powering the Device</a:t>
             </a:r>
           </a:p>
@@ -4416,17 +4425,19 @@
         </p:nvSpPr>
         <p:spPr/>
         <p:txBody>
-          <a:bodyPr/>
-          <a:lstStyle/>
-          <a:p>
-            <a:r>
-              <a:rPr lang="en-IE" dirty="0"/>
+          <a:bodyPr>
+            <a:normAutofit/>
+          </a:bodyPr>
+          <a:lstStyle/>
+          <a:p>
+            <a:r>
+              <a:rPr lang="en-IE" sz="2400" dirty="0"/>
               <a:t>The device will be plugged into the wall.</a:t>
             </a:r>
           </a:p>
           <a:p>
             <a:r>
-              <a:rPr lang="en-IE" dirty="0"/>
+              <a:rPr lang="en-IE" sz="2400" dirty="0"/>
               <a:t>The device will use an Uninterruptible Power Supply (UPS) to handle loss of power. This will require 2 rechargeable batteries.</a:t>
             </a:r>
           </a:p>
@@ -4484,10 +4495,10 @@
           <a:lstStyle/>
           <a:p>
             <a:r>
-              <a:rPr lang="en-GB" dirty="0"/>
+              <a:rPr lang="en-GB" b="1" dirty="0"/>
               <a:t>Network Connectivity</a:t>
             </a:r>
-            <a:endParaRPr lang="en-IE" dirty="0"/>
+            <a:endParaRPr lang="en-IE" b="1" dirty="0"/>
           </a:p>
         </p:txBody>
       </p:sp>
@@ -4509,17 +4520,19 @@
         </p:nvSpPr>
         <p:spPr/>
         <p:txBody>
-          <a:bodyPr/>
-          <a:lstStyle/>
-          <a:p>
-            <a:r>
-              <a:rPr lang="en-GB" dirty="0"/>
+          <a:bodyPr>
+            <a:normAutofit/>
+          </a:bodyPr>
+          <a:lstStyle/>
+          <a:p>
+            <a:r>
+              <a:rPr lang="en-GB" sz="2400" dirty="0"/>
               <a:t>The device will connect to local Wi-Fi using the Raspberry Pi’s onboard wireless LAN.</a:t>
             </a:r>
           </a:p>
           <a:p>
             <a:r>
-              <a:rPr lang="en-IE" dirty="0"/>
+              <a:rPr lang="en-IE" sz="2400" dirty="0"/>
               <a:t>When the device loses its connection to the internet, it will switch to using its onboard storage. When the connection is reestablished, it will bundle all local data and send it to the server.</a:t>
             </a:r>
           </a:p>
@@ -4584,17 +4597,21 @@
           </a:bodyPr>
           <a:lstStyle/>
           <a:p>
-            <a:pPr algn="ctr">
+            <a:pPr>
               <a:lnSpc>
                 <a:spcPct val="100000"/>
               </a:lnSpc>
               <a:buNone/>
             </a:pPr>
             <a:r>
-              <a:rPr lang="en-IE" sz="4400" b="0" strike="noStrike" spc="-1">
-                <a:latin typeface="Arial"/>
+              <a:rPr lang="en-IE" sz="4400" b="1" strike="noStrike" spc="-1" dirty="0"/>
+              <a:t>Data </a:t>
+            </a:r>
+            <a:r>
+              <a:rPr lang="en-IE" sz="4400" b="1" strike="noStrike" spc="-1" dirty="0">
+                <a:cs typeface="Arial" panose="020B0604020202020204" pitchFamily="34" charset="0"/>
               </a:rPr>
-              <a:t>Data Storage</a:t>
+              <a:t>Storage</a:t>
             </a:r>
           </a:p>
         </p:txBody>
@@ -4643,18 +4660,51 @@
               <a:buNone/>
             </a:pPr>
             <a:r>
-              <a:rPr lang="en-IE" sz="1800" b="0" strike="noStrike" spc="-1">
+              <a:rPr lang="en-IE" sz="2400" b="0" strike="noStrike" spc="-1" dirty="0">
                 <a:solidFill>
                   <a:srgbClr val="000000"/>
                 </a:solidFill>
-                <a:latin typeface="Arial"/>
                 <a:ea typeface="DejaVu Sans"/>
               </a:rPr>
-              <a:t>The primary database will be a mongodb database hosted on the AWS server. A secondary database will exist on the Rasberry Pi. This will contain enough data to be able to operate the pill box for a period of time if the connection to the server fails.</a:t>
-            </a:r>
-            <a:endParaRPr lang="en-IE" sz="1800" b="0" strike="noStrike" spc="-1">
-              <a:latin typeface="Arial"/>
-            </a:endParaRPr>
+              <a:t>The primary database will be a </a:t>
+            </a:r>
+            <a:r>
+              <a:rPr lang="en-IE" sz="2400" b="0" strike="noStrike" spc="-1" dirty="0" err="1">
+                <a:solidFill>
+                  <a:srgbClr val="000000"/>
+                </a:solidFill>
+                <a:ea typeface="DejaVu Sans"/>
+              </a:rPr>
+              <a:t>mongodb</a:t>
+            </a:r>
+            <a:r>
+              <a:rPr lang="en-IE" sz="2400" b="0" strike="noStrike" spc="-1" dirty="0">
+                <a:solidFill>
+                  <a:srgbClr val="000000"/>
+                </a:solidFill>
+                <a:ea typeface="DejaVu Sans"/>
+              </a:rPr>
+              <a:t> database hosted on the AWS server. A secondary database will exist on the </a:t>
+            </a:r>
+            <a:r>
+              <a:rPr lang="en-IE" sz="2400" b="0" strike="noStrike" spc="-1" dirty="0" err="1">
+                <a:solidFill>
+                  <a:srgbClr val="000000"/>
+                </a:solidFill>
+                <a:ea typeface="DejaVu Sans"/>
+              </a:rPr>
+              <a:t>Rasberry</a:t>
+            </a:r>
+            <a:r>
+              <a:rPr lang="en-IE" sz="2400" b="0" strike="noStrike" spc="-1" dirty="0">
+                <a:solidFill>
+                  <a:srgbClr val="000000"/>
+                </a:solidFill>
+                <a:ea typeface="DejaVu Sans"/>
+              </a:rPr>
+              <a:t> Pi. This will contain enough data to be able to operate the pill box for a period of time if the connection to the server fails.</a:t>
+            </a:r>
+            <a:endParaRPr lang="en-IE" sz="2400" b="0" strike="noStrike" spc="-1" dirty="0"/>
           </a:p>
           <a:p>
             <a:pPr>
@@ -4663,7 +4713,7 @@
               </a:lnSpc>
               <a:buNone/>
             </a:pPr>
-            <a:endParaRPr lang="en-IE" sz="1800" b="0" strike="noStrike" spc="-1">
+            <a:endParaRPr lang="en-IE" sz="1800" b="0" strike="noStrike" spc="-1" dirty="0">
               <a:latin typeface="Arial"/>
             </a:endParaRPr>
           </a:p>
@@ -4723,16 +4773,14 @@
           </a:bodyPr>
           <a:lstStyle/>
           <a:p>
-            <a:pPr algn="ctr">
+            <a:pPr>
               <a:lnSpc>
                 <a:spcPct val="100000"/>
               </a:lnSpc>
               <a:buNone/>
             </a:pPr>
             <a:r>
-              <a:rPr lang="en-IE" sz="4400" b="0" strike="noStrike" spc="-1">
-                <a:latin typeface="Arial"/>
-              </a:rPr>
+              <a:rPr lang="en-IE" sz="4400" b="1" strike="noStrike" spc="-1" dirty="0"/>
               <a:t>Data Storage – Example Entries</a:t>
             </a:r>
           </a:p>
@@ -4805,17 +4853,17 @@
               <a:buNone/>
             </a:pPr>
             <a:r>
-              <a:rPr lang="en-IE" sz="1800" b="0" strike="noStrike" spc="-1">
+              <a:rPr lang="en-IE" sz="2400" b="0" strike="noStrike" spc="-1" dirty="0">
                 <a:solidFill>
                   <a:srgbClr val="000000"/>
                 </a:solidFill>
-                <a:latin typeface="Arial"/>
                 <a:ea typeface="DejaVu Sans"/>
+                <a:cs typeface="Arial" panose="020B0604020202020204" pitchFamily="34" charset="0"/>
               </a:rPr>
               <a:t>User Entry on server</a:t>
             </a:r>
-            <a:endParaRPr lang="en-IE" sz="1800" b="0" strike="noStrike" spc="-1">
-              <a:latin typeface="Arial"/>
+            <a:endParaRPr lang="en-IE" sz="2400" b="0" strike="noStrike" spc="-1" dirty="0">
+              <a:cs typeface="Arial" panose="020B0604020202020204" pitchFamily="34" charset="0"/>
             </a:endParaRPr>
           </a:p>
         </p:txBody>
@@ -4887,18 +4935,33 @@
               <a:buNone/>
             </a:pPr>
             <a:r>
-              <a:rPr lang="en-IE" sz="1800" b="0" strike="noStrike" spc="-1">
+              <a:rPr lang="en-IE" sz="2400" b="0" strike="noStrike" spc="-1" dirty="0">
                 <a:solidFill>
                   <a:srgbClr val="000000"/>
                 </a:solidFill>
-                <a:latin typeface="Arial"/>
                 <a:ea typeface="DejaVu Sans"/>
               </a:rPr>
-              <a:t>Schedule stored on Rasberry Pi</a:t>
-            </a:r>
-            <a:endParaRPr lang="en-IE" sz="1800" b="0" strike="noStrike" spc="-1">
-              <a:latin typeface="Arial"/>
-            </a:endParaRPr>
+              <a:t>Schedule stored on </a:t>
+            </a:r>
+            <a:r>
+              <a:rPr lang="en-IE" sz="2400" b="0" strike="noStrike" spc="-1" dirty="0" err="1">
+                <a:solidFill>
+                  <a:srgbClr val="000000"/>
+                </a:solidFill>
+                <a:ea typeface="DejaVu Sans"/>
+              </a:rPr>
+              <a:t>Rasberry</a:t>
+            </a:r>
+            <a:r>
+              <a:rPr lang="en-IE" sz="2400" b="0" strike="noStrike" spc="-1" dirty="0">
+                <a:solidFill>
+                  <a:srgbClr val="000000"/>
+                </a:solidFill>
+                <a:ea typeface="DejaVu Sans"/>
+              </a:rPr>
+              <a:t> Pi</a:t>
+            </a:r>
+            <a:endParaRPr lang="en-IE" sz="2400" b="0" strike="noStrike" spc="-1" dirty="0"/>
           </a:p>
         </p:txBody>
       </p:sp>
@@ -4956,16 +5019,14 @@
           </a:bodyPr>
           <a:lstStyle/>
           <a:p>
-            <a:pPr algn="ctr">
+            <a:pPr>
               <a:lnSpc>
                 <a:spcPct val="100000"/>
               </a:lnSpc>
               <a:buNone/>
             </a:pPr>
             <a:r>
-              <a:rPr lang="en-IE" sz="4400" b="0" strike="noStrike" spc="-1">
-                <a:latin typeface="Arial"/>
-              </a:rPr>
+              <a:rPr lang="en-IE" sz="4400" b="1" strike="noStrike" spc="-1" dirty="0"/>
               <a:t>Data Gathering - Switches</a:t>
             </a:r>
           </a:p>
@@ -5015,18 +5076,15 @@
               <a:buNone/>
             </a:pPr>
             <a:r>
-              <a:rPr lang="en-IE" sz="1800" b="0" strike="noStrike" spc="-1">
+              <a:rPr lang="en-IE" sz="2400" b="0" strike="noStrike" spc="-1" dirty="0">
                 <a:solidFill>
                   <a:srgbClr val="000000"/>
                 </a:solidFill>
-                <a:latin typeface="Arial"/>
                 <a:ea typeface="DejaVu Sans"/>
               </a:rPr>
               <a:t>Force Sensitive Resistor</a:t>
             </a:r>
-            <a:endParaRPr lang="en-IE" sz="1800" b="0" strike="noStrike" spc="-1">
-              <a:latin typeface="Arial"/>
-            </a:endParaRPr>
+            <a:endParaRPr lang="en-IE" sz="2400" b="0" strike="noStrike" spc="-1" dirty="0"/>
           </a:p>
           <a:p>
             <a:pPr>
@@ -5036,18 +5094,15 @@
               <a:buNone/>
             </a:pPr>
             <a:r>
-              <a:rPr lang="en-IE" sz="1800" b="0" strike="noStrike" spc="-1">
+              <a:rPr lang="en-IE" sz="2400" b="0" strike="noStrike" spc="-1" dirty="0">
                 <a:solidFill>
                   <a:srgbClr val="000000"/>
                 </a:solidFill>
-                <a:latin typeface="Arial"/>
                 <a:ea typeface="DejaVu Sans"/>
               </a:rPr>
               <a:t>	- Analog data</a:t>
             </a:r>
-            <a:endParaRPr lang="en-IE" sz="1800" b="0" strike="noStrike" spc="-1">
-              <a:latin typeface="Arial"/>
-            </a:endParaRPr>
+            <a:endParaRPr lang="en-IE" sz="2400" b="0" strike="noStrike" spc="-1" dirty="0"/>
           </a:p>
           <a:p>
             <a:pPr>
@@ -5057,18 +5112,15 @@
               <a:buNone/>
             </a:pPr>
             <a:r>
-              <a:rPr lang="en-IE" sz="1800" b="0" strike="noStrike" spc="-1">
+              <a:rPr lang="en-IE" sz="2400" b="0" strike="noStrike" spc="-1" dirty="0">
                 <a:solidFill>
                   <a:srgbClr val="000000"/>
                 </a:solidFill>
-                <a:latin typeface="Arial"/>
                 <a:ea typeface="DejaVu Sans"/>
               </a:rPr>
               <a:t>	- Values between 0mV – 5000mV</a:t>
             </a:r>
-            <a:endParaRPr lang="en-IE" sz="1800" b="0" strike="noStrike" spc="-1">
-              <a:latin typeface="Arial"/>
-            </a:endParaRPr>
+            <a:endParaRPr lang="en-IE" sz="2400" b="0" strike="noStrike" spc="-1" dirty="0"/>
           </a:p>
           <a:p>
             <a:pPr>
@@ -5078,18 +5130,33 @@
               <a:buNone/>
             </a:pPr>
             <a:r>
-              <a:rPr lang="en-IE" sz="1800" b="0" strike="noStrike" spc="-1">
+              <a:rPr lang="en-IE" sz="2400" b="0" strike="noStrike" spc="-1" dirty="0">
                 <a:solidFill>
                   <a:srgbClr val="000000"/>
                 </a:solidFill>
-                <a:latin typeface="Arial"/>
                 <a:ea typeface="DejaVu Sans"/>
               </a:rPr>
-              <a:t>	- 0mV reprensents no force</a:t>
-            </a:r>
-            <a:endParaRPr lang="en-IE" sz="1800" b="0" strike="noStrike" spc="-1">
-              <a:latin typeface="Arial"/>
-            </a:endParaRPr>
+              <a:t>	- 0mV </a:t>
+            </a:r>
+            <a:r>
+              <a:rPr lang="en-IE" sz="2400" b="0" strike="noStrike" spc="-1" dirty="0" err="1">
+                <a:solidFill>
+                  <a:srgbClr val="000000"/>
+                </a:solidFill>
+                <a:ea typeface="DejaVu Sans"/>
+              </a:rPr>
+              <a:t>reprensents</a:t>
+            </a:r>
+            <a:r>
+              <a:rPr lang="en-IE" sz="2400" b="0" strike="noStrike" spc="-1" dirty="0">
+                <a:solidFill>
+                  <a:srgbClr val="000000"/>
+                </a:solidFill>
+                <a:ea typeface="DejaVu Sans"/>
+              </a:rPr>
+              <a:t> no force</a:t>
+            </a:r>
+            <a:endParaRPr lang="en-IE" sz="2400" b="0" strike="noStrike" spc="-1" dirty="0"/>
           </a:p>
           <a:p>
             <a:pPr>
@@ -5099,18 +5166,15 @@
               <a:buNone/>
             </a:pPr>
             <a:r>
-              <a:rPr lang="en-IE" sz="1800" b="0" strike="noStrike" spc="-1">
+              <a:rPr lang="en-IE" sz="2400" b="0" strike="noStrike" spc="-1" dirty="0">
                 <a:solidFill>
                   <a:srgbClr val="000000"/>
                 </a:solidFill>
-                <a:latin typeface="Arial"/>
                 <a:ea typeface="DejaVu Sans"/>
               </a:rPr>
               <a:t>	- 5000mV represents a high force</a:t>
             </a:r>
-            <a:endParaRPr lang="en-IE" sz="1800" b="0" strike="noStrike" spc="-1">
-              <a:latin typeface="Arial"/>
-            </a:endParaRPr>
+            <a:endParaRPr lang="en-IE" sz="2400" b="0" strike="noStrike" spc="-1" dirty="0"/>
           </a:p>
           <a:p>
             <a:pPr>
@@ -5120,18 +5184,15 @@
               <a:buNone/>
             </a:pPr>
             <a:r>
-              <a:rPr lang="en-IE" sz="1800" b="0" strike="noStrike" spc="-1">
+              <a:rPr lang="en-IE" sz="2400" b="0" strike="noStrike" spc="-1" dirty="0">
                 <a:solidFill>
                   <a:srgbClr val="000000"/>
                 </a:solidFill>
-                <a:latin typeface="Arial"/>
                 <a:ea typeface="DejaVu Sans"/>
               </a:rPr>
               <a:t>	- This will tell us if a box is empty or has pills inside</a:t>
             </a:r>
-            <a:endParaRPr lang="en-IE" sz="1800" b="0" strike="noStrike" spc="-1">
-              <a:latin typeface="Arial"/>
-            </a:endParaRPr>
+            <a:endParaRPr lang="en-IE" sz="2400" b="0" strike="noStrike" spc="-1" dirty="0"/>
           </a:p>
           <a:p>
             <a:pPr>
@@ -5140,9 +5201,7 @@
               </a:lnSpc>
               <a:buNone/>
             </a:pPr>
-            <a:endParaRPr lang="en-IE" sz="1800" b="0" strike="noStrike" spc="-1">
-              <a:latin typeface="Arial"/>
-            </a:endParaRPr>
+            <a:endParaRPr lang="en-IE" sz="2400" b="0" strike="noStrike" spc="-1" dirty="0"/>
           </a:p>
           <a:p>
             <a:pPr>
@@ -5151,9 +5210,7 @@
               </a:lnSpc>
               <a:buNone/>
             </a:pPr>
-            <a:endParaRPr lang="en-IE" sz="1800" b="0" strike="noStrike" spc="-1">
-              <a:latin typeface="Arial"/>
-            </a:endParaRPr>
+            <a:endParaRPr lang="en-IE" sz="2400" b="0" strike="noStrike" spc="-1" dirty="0"/>
           </a:p>
           <a:p>
             <a:pPr>
@@ -5163,18 +5220,15 @@
               <a:buNone/>
             </a:pPr>
             <a:r>
-              <a:rPr lang="en-IE" sz="1800" b="0" strike="noStrike" spc="-1">
+              <a:rPr lang="en-IE" sz="2400" b="0" strike="noStrike" spc="-1" dirty="0">
                 <a:solidFill>
                   <a:srgbClr val="000000"/>
                 </a:solidFill>
-                <a:latin typeface="Arial"/>
                 <a:ea typeface="DejaVu Sans"/>
               </a:rPr>
               <a:t>Micro Switch</a:t>
             </a:r>
-            <a:endParaRPr lang="en-IE" sz="1800" b="0" strike="noStrike" spc="-1">
-              <a:latin typeface="Arial"/>
-            </a:endParaRPr>
+            <a:endParaRPr lang="en-IE" sz="2400" b="0" strike="noStrike" spc="-1" dirty="0"/>
           </a:p>
           <a:p>
             <a:pPr>
@@ -5184,18 +5238,15 @@
               <a:buNone/>
             </a:pPr>
             <a:r>
-              <a:rPr lang="en-IE" sz="1800" b="0" strike="noStrike" spc="-1">
+              <a:rPr lang="en-IE" sz="2400" b="0" strike="noStrike" spc="-1" dirty="0">
                 <a:solidFill>
                   <a:srgbClr val="000000"/>
                 </a:solidFill>
-                <a:latin typeface="Arial"/>
                 <a:ea typeface="DejaVu Sans"/>
               </a:rPr>
               <a:t>	- 0v across a switch when the circuit is not completed</a:t>
             </a:r>
-            <a:endParaRPr lang="en-IE" sz="1800" b="0" strike="noStrike" spc="-1">
-              <a:latin typeface="Arial"/>
-            </a:endParaRPr>
+            <a:endParaRPr lang="en-IE" sz="2400" b="0" strike="noStrike" spc="-1" dirty="0"/>
           </a:p>
           <a:p>
             <a:pPr>
@@ -5205,18 +5256,15 @@
               <a:buNone/>
             </a:pPr>
             <a:r>
-              <a:rPr lang="en-IE" sz="1800" b="0" strike="noStrike" spc="-1">
+              <a:rPr lang="en-IE" sz="2400" b="0" strike="noStrike" spc="-1" dirty="0">
                 <a:solidFill>
                   <a:srgbClr val="000000"/>
                 </a:solidFill>
-                <a:latin typeface="Arial"/>
                 <a:ea typeface="DejaVu Sans"/>
               </a:rPr>
               <a:t>	- 5v across a switch when the circuit is completed.</a:t>
             </a:r>
-            <a:endParaRPr lang="en-IE" sz="1800" b="0" strike="noStrike" spc="-1">
-              <a:latin typeface="Arial"/>
-            </a:endParaRPr>
+            <a:endParaRPr lang="en-IE" sz="2400" b="0" strike="noStrike" spc="-1" dirty="0"/>
           </a:p>
           <a:p>
             <a:pPr>
@@ -5226,18 +5274,15 @@
               <a:buNone/>
             </a:pPr>
             <a:r>
-              <a:rPr lang="en-IE" sz="1800" b="0" strike="noStrike" spc="-1">
+              <a:rPr lang="en-IE" sz="2400" b="0" strike="noStrike" spc="-1" dirty="0">
                 <a:solidFill>
                   <a:srgbClr val="000000"/>
                 </a:solidFill>
-                <a:latin typeface="Arial"/>
                 <a:ea typeface="DejaVu Sans"/>
               </a:rPr>
               <a:t>	- This will tell us if a box is open or closed</a:t>
             </a:r>
-            <a:endParaRPr lang="en-IE" sz="1800" b="0" strike="noStrike" spc="-1">
-              <a:latin typeface="Arial"/>
-            </a:endParaRPr>
+            <a:endParaRPr lang="en-IE" sz="2400" b="0" strike="noStrike" spc="-1" dirty="0"/>
           </a:p>
         </p:txBody>
       </p:sp>
@@ -5318,16 +5363,14 @@
           </a:bodyPr>
           <a:lstStyle/>
           <a:p>
-            <a:pPr algn="ctr">
+            <a:pPr>
               <a:lnSpc>
                 <a:spcPct val="100000"/>
               </a:lnSpc>
               <a:buNone/>
             </a:pPr>
             <a:r>
-              <a:rPr lang="en-IE" sz="4400" b="0" strike="noStrike" spc="-1">
-                <a:latin typeface="Arial"/>
-              </a:rPr>
+              <a:rPr lang="en-IE" sz="4400" b="1" strike="noStrike" spc="-1" dirty="0"/>
               <a:t>Data Gathering - User</a:t>
             </a:r>
           </a:p>
@@ -5341,7 +5384,7 @@
         </p:nvSpPr>
         <p:spPr>
           <a:xfrm>
-            <a:off x="540000" y="1620000"/>
+            <a:off x="515520" y="1414440"/>
             <a:ext cx="11156400" cy="1878480"/>
           </a:xfrm>
           <a:prstGeom prst="rect">
@@ -5377,18 +5420,15 @@
               <a:buNone/>
             </a:pPr>
             <a:r>
-              <a:rPr lang="en-IE" sz="1800" b="0" strike="noStrike" spc="-1">
+              <a:rPr lang="en-IE" sz="2400" b="0" strike="noStrike" spc="-1" dirty="0">
                 <a:solidFill>
                   <a:srgbClr val="000000"/>
                 </a:solidFill>
-                <a:latin typeface="Arial"/>
                 <a:ea typeface="DejaVu Sans"/>
               </a:rPr>
               <a:t>User Data</a:t>
             </a:r>
-            <a:endParaRPr lang="en-IE" sz="1800" b="0" strike="noStrike" spc="-1">
-              <a:latin typeface="Arial"/>
-            </a:endParaRPr>
+            <a:endParaRPr lang="en-IE" sz="2400" b="0" strike="noStrike" spc="-1" dirty="0"/>
           </a:p>
           <a:p>
             <a:pPr>
@@ -5398,18 +5438,15 @@
               <a:buNone/>
             </a:pPr>
             <a:r>
-              <a:rPr lang="en-IE" sz="1800" b="0" strike="noStrike" spc="-1">
+              <a:rPr lang="en-IE" sz="2400" b="0" strike="noStrike" spc="-1" dirty="0">
                 <a:solidFill>
                   <a:srgbClr val="000000"/>
                 </a:solidFill>
-                <a:latin typeface="Arial"/>
                 <a:ea typeface="DejaVu Sans"/>
               </a:rPr>
               <a:t>	- User email</a:t>
             </a:r>
-            <a:endParaRPr lang="en-IE" sz="1800" b="0" strike="noStrike" spc="-1">
-              <a:latin typeface="Arial"/>
-            </a:endParaRPr>
+            <a:endParaRPr lang="en-IE" sz="2400" b="0" strike="noStrike" spc="-1" dirty="0"/>
           </a:p>
           <a:p>
             <a:pPr>
@@ -5419,18 +5456,15 @@
               <a:buNone/>
             </a:pPr>
             <a:r>
-              <a:rPr lang="en-IE" sz="1800" b="0" strike="noStrike" spc="-1">
+              <a:rPr lang="en-IE" sz="2400" b="0" strike="noStrike" spc="-1" dirty="0">
                 <a:solidFill>
                   <a:srgbClr val="000000"/>
                 </a:solidFill>
-                <a:latin typeface="Arial"/>
                 <a:ea typeface="DejaVu Sans"/>
               </a:rPr>
               <a:t>	- Password</a:t>
             </a:r>
-            <a:endParaRPr lang="en-IE" sz="1800" b="0" strike="noStrike" spc="-1">
-              <a:latin typeface="Arial"/>
-            </a:endParaRPr>
+            <a:endParaRPr lang="en-IE" sz="2400" b="0" strike="noStrike" spc="-1" dirty="0"/>
           </a:p>
           <a:p>
             <a:pPr>
@@ -5440,18 +5474,15 @@
               <a:buNone/>
             </a:pPr>
             <a:r>
-              <a:rPr lang="en-IE" sz="1800" b="0" strike="noStrike" spc="-1">
+              <a:rPr lang="en-IE" sz="2400" b="0" strike="noStrike" spc="-1" dirty="0">
                 <a:solidFill>
                   <a:srgbClr val="000000"/>
                 </a:solidFill>
-                <a:latin typeface="Arial"/>
                 <a:ea typeface="DejaVu Sans"/>
               </a:rPr>
               <a:t>	- This will be used to create a user account</a:t>
             </a:r>
-            <a:endParaRPr lang="en-IE" sz="1800" b="0" strike="noStrike" spc="-1">
-              <a:latin typeface="Arial"/>
-            </a:endParaRPr>
+            <a:endParaRPr lang="en-IE" sz="2400" b="0" strike="noStrike" spc="-1" dirty="0"/>
           </a:p>
           <a:p>
             <a:pPr>
@@ -5460,9 +5491,7 @@
               </a:lnSpc>
               <a:buNone/>
             </a:pPr>
-            <a:endParaRPr lang="en-IE" sz="1800" b="0" strike="noStrike" spc="-1">
-              <a:latin typeface="Arial"/>
-            </a:endParaRPr>
+            <a:endParaRPr lang="en-IE" sz="2400" b="0" strike="noStrike" spc="-1" dirty="0"/>
           </a:p>
           <a:p>
             <a:pPr>
@@ -5472,18 +5501,15 @@
               <a:buNone/>
             </a:pPr>
             <a:r>
-              <a:rPr lang="en-IE" sz="1800" b="0" strike="noStrike" spc="-1">
+              <a:rPr lang="en-IE" sz="2400" b="0" strike="noStrike" spc="-1" dirty="0">
                 <a:solidFill>
                   <a:srgbClr val="000000"/>
                 </a:solidFill>
-                <a:latin typeface="Arial"/>
                 <a:ea typeface="DejaVu Sans"/>
               </a:rPr>
               <a:t>Medication</a:t>
             </a:r>
-            <a:endParaRPr lang="en-IE" sz="1800" b="0" strike="noStrike" spc="-1">
-              <a:latin typeface="Arial"/>
-            </a:endParaRPr>
+            <a:endParaRPr lang="en-IE" sz="2400" b="0" strike="noStrike" spc="-1" dirty="0"/>
           </a:p>
           <a:p>
             <a:pPr>
@@ -5493,18 +5519,15 @@
               <a:buNone/>
             </a:pPr>
             <a:r>
-              <a:rPr lang="en-IE" sz="1800" b="0" strike="noStrike" spc="-1">
+              <a:rPr lang="en-IE" sz="2400" b="0" strike="noStrike" spc="-1" dirty="0">
                 <a:solidFill>
                   <a:srgbClr val="000000"/>
                 </a:solidFill>
-                <a:latin typeface="Arial"/>
                 <a:ea typeface="DejaVu Sans"/>
               </a:rPr>
               <a:t>	- Medication details</a:t>
             </a:r>
-            <a:endParaRPr lang="en-IE" sz="1800" b="0" strike="noStrike" spc="-1">
-              <a:latin typeface="Arial"/>
-            </a:endParaRPr>
+            <a:endParaRPr lang="en-IE" sz="2400" b="0" strike="noStrike" spc="-1" dirty="0"/>
           </a:p>
           <a:p>
             <a:pPr>
@@ -5514,18 +5537,15 @@
               <a:buNone/>
             </a:pPr>
             <a:r>
-              <a:rPr lang="en-IE" sz="1800" b="0" strike="noStrike" spc="-1">
+              <a:rPr lang="en-IE" sz="2400" b="0" strike="noStrike" spc="-1" dirty="0">
                 <a:solidFill>
                   <a:srgbClr val="000000"/>
                 </a:solidFill>
-                <a:latin typeface="Arial"/>
                 <a:ea typeface="DejaVu Sans"/>
               </a:rPr>
               <a:t>	- This will be used to assist in refilling the boxes and to create medication histories</a:t>
             </a:r>
-            <a:endParaRPr lang="en-IE" sz="1800" b="0" strike="noStrike" spc="-1">
-              <a:latin typeface="Arial"/>
-            </a:endParaRPr>
+            <a:endParaRPr lang="en-IE" sz="2400" b="0" strike="noStrike" spc="-1" dirty="0"/>
           </a:p>
           <a:p>
             <a:pPr>
@@ -5534,9 +5554,7 @@
               </a:lnSpc>
               <a:buNone/>
             </a:pPr>
-            <a:endParaRPr lang="en-IE" sz="1800" b="0" strike="noStrike" spc="-1">
-              <a:latin typeface="Arial"/>
-            </a:endParaRPr>
+            <a:endParaRPr lang="en-IE" sz="2400" b="0" strike="noStrike" spc="-1" dirty="0"/>
           </a:p>
           <a:p>
             <a:pPr>
@@ -5546,18 +5564,15 @@
               <a:buNone/>
             </a:pPr>
             <a:r>
-              <a:rPr lang="en-IE" sz="1800" b="0" strike="noStrike" spc="-1">
+              <a:rPr lang="en-IE" sz="2400" b="0" strike="noStrike" spc="-1" dirty="0">
                 <a:solidFill>
                   <a:srgbClr val="000000"/>
                 </a:solidFill>
-                <a:latin typeface="Arial"/>
                 <a:ea typeface="DejaVu Sans"/>
               </a:rPr>
               <a:t>Time</a:t>
             </a:r>
-            <a:endParaRPr lang="en-IE" sz="1800" b="0" strike="noStrike" spc="-1">
-              <a:latin typeface="Arial"/>
-            </a:endParaRPr>
+            <a:endParaRPr lang="en-IE" sz="2400" b="0" strike="noStrike" spc="-1" dirty="0"/>
           </a:p>
           <a:p>
             <a:pPr>
@@ -5567,18 +5582,15 @@
               <a:buNone/>
             </a:pPr>
             <a:r>
-              <a:rPr lang="en-IE" sz="1800" b="0" strike="noStrike" spc="-1">
+              <a:rPr lang="en-IE" sz="2400" b="0" strike="noStrike" spc="-1" dirty="0">
                 <a:solidFill>
                   <a:srgbClr val="000000"/>
                 </a:solidFill>
-                <a:latin typeface="Arial"/>
                 <a:ea typeface="DejaVu Sans"/>
               </a:rPr>
               <a:t>	- To send notifications</a:t>
             </a:r>
-            <a:endParaRPr lang="en-IE" sz="1800" b="0" strike="noStrike" spc="-1">
-              <a:latin typeface="Arial"/>
-            </a:endParaRPr>
+            <a:endParaRPr lang="en-IE" sz="2400" b="0" strike="noStrike" spc="-1" dirty="0"/>
           </a:p>
           <a:p>
             <a:pPr>
@@ -5588,18 +5600,15 @@
               <a:buNone/>
             </a:pPr>
             <a:r>
-              <a:rPr lang="en-IE" sz="1800" b="0" strike="noStrike" spc="-1">
+              <a:rPr lang="en-IE" sz="2400" b="0" strike="noStrike" spc="-1" dirty="0">
                 <a:solidFill>
                   <a:srgbClr val="000000"/>
                 </a:solidFill>
-                <a:latin typeface="Arial"/>
                 <a:ea typeface="DejaVu Sans"/>
               </a:rPr>
               <a:t>	- To see when a box was opened</a:t>
             </a:r>
-            <a:endParaRPr lang="en-IE" sz="1800" b="0" strike="noStrike" spc="-1">
-              <a:latin typeface="Arial"/>
-            </a:endParaRPr>
+            <a:endParaRPr lang="en-IE" sz="2400" b="0" strike="noStrike" spc="-1" dirty="0"/>
           </a:p>
           <a:p>
             <a:pPr>
@@ -5609,18 +5618,24 @@
               <a:buNone/>
             </a:pPr>
             <a:r>
-              <a:rPr lang="en-IE" sz="1800" b="0" strike="noStrike" spc="-1">
+              <a:rPr lang="en-IE" sz="2400" b="0" strike="noStrike" spc="-1" dirty="0">
                 <a:solidFill>
                   <a:srgbClr val="000000"/>
                 </a:solidFill>
-                <a:latin typeface="Arial"/>
                 <a:ea typeface="DejaVu Sans"/>
               </a:rPr>
-              <a:t>	- To record missed doeses</a:t>
-            </a:r>
-            <a:endParaRPr lang="en-IE" sz="1800" b="0" strike="noStrike" spc="-1">
-              <a:latin typeface="Arial"/>
-            </a:endParaRPr>
+              <a:t>	- To record missed </a:t>
+            </a:r>
+            <a:r>
+              <a:rPr lang="en-IE" sz="2400" b="0" strike="noStrike" spc="-1" dirty="0" err="1">
+                <a:solidFill>
+                  <a:srgbClr val="000000"/>
+                </a:solidFill>
+                <a:ea typeface="DejaVu Sans"/>
+              </a:rPr>
+              <a:t>doeses</a:t>
+            </a:r>
+            <a:endParaRPr lang="en-IE" sz="2400" b="0" strike="noStrike" spc="-1" dirty="0"/>
           </a:p>
         </p:txBody>
       </p:sp>
@@ -5671,7 +5686,7 @@
           <a:lstStyle/>
           <a:p>
             <a:r>
-              <a:rPr lang="en-GB" dirty="0"/>
+              <a:rPr lang="en-GB" b="1" dirty="0"/>
               <a:t>Get to know the team</a:t>
             </a:r>
           </a:p>
@@ -5836,7 +5851,7 @@
         <p:spPr>
           <a:xfrm>
             <a:off x="770602" y="3942129"/>
-            <a:ext cx="2521258" cy="1569660"/>
+            <a:ext cx="2521258" cy="2246769"/>
           </a:xfrm>
           <a:prstGeom prst="rect">
             <a:avLst/>
@@ -5851,17 +5866,17 @@
           <a:p>
             <a:pPr algn="ctr"/>
             <a:r>
-              <a:rPr lang="en-GB" dirty="0"/>
+              <a:rPr lang="en-GB" sz="2000" dirty="0"/>
               <a:t>Cian Ashby</a:t>
             </a:r>
           </a:p>
           <a:p>
             <a:pPr algn="ctr"/>
-            <a:endParaRPr lang="en-GB" dirty="0"/>
-          </a:p>
-          <a:p>
-            <a:r>
-              <a:rPr lang="en-GB" dirty="0"/>
+            <a:endParaRPr lang="en-GB" sz="2000" dirty="0"/>
+          </a:p>
+          <a:p>
+            <a:r>
+              <a:rPr lang="en-GB" sz="2000" dirty="0"/>
               <a:t>Roles</a:t>
             </a:r>
           </a:p>
@@ -5871,7 +5886,7 @@
               <a:buChar char="•"/>
             </a:pPr>
             <a:r>
-              <a:rPr lang="en-GB" sz="1400" dirty="0"/>
+              <a:rPr lang="en-GB" sz="2000" dirty="0"/>
               <a:t>Team Lead</a:t>
             </a:r>
           </a:p>
@@ -5881,7 +5896,7 @@
               <a:buChar char="•"/>
             </a:pPr>
             <a:r>
-              <a:rPr lang="en-GB" sz="1400" dirty="0"/>
+              <a:rPr lang="en-GB" sz="2000" dirty="0"/>
               <a:t>Front End Developer</a:t>
             </a:r>
           </a:p>
@@ -5891,7 +5906,7 @@
               <a:buChar char="•"/>
             </a:pPr>
             <a:r>
-              <a:rPr lang="en-GB" sz="1400" dirty="0"/>
+              <a:rPr lang="en-GB" sz="2000" dirty="0"/>
               <a:t>User Tester</a:t>
             </a:r>
           </a:p>
@@ -5912,7 +5927,7 @@
         <p:spPr>
           <a:xfrm>
             <a:off x="3417091" y="3942129"/>
-            <a:ext cx="2521258" cy="1354217"/>
+            <a:ext cx="2521258" cy="1938992"/>
           </a:xfrm>
           <a:prstGeom prst="rect">
             <a:avLst/>
@@ -5927,17 +5942,17 @@
           <a:p>
             <a:pPr algn="ctr"/>
             <a:r>
-              <a:rPr lang="en-GB" dirty="0"/>
+              <a:rPr lang="en-GB" sz="2000" dirty="0"/>
               <a:t>Jason Njoku</a:t>
             </a:r>
           </a:p>
           <a:p>
             <a:pPr algn="ctr"/>
-            <a:endParaRPr lang="en-GB" dirty="0"/>
-          </a:p>
-          <a:p>
-            <a:r>
-              <a:rPr lang="en-GB" dirty="0"/>
+            <a:endParaRPr lang="en-GB" sz="2000" dirty="0"/>
+          </a:p>
+          <a:p>
+            <a:r>
+              <a:rPr lang="en-GB" sz="2000" dirty="0"/>
               <a:t>Roles</a:t>
             </a:r>
           </a:p>
@@ -5947,7 +5962,7 @@
               <a:buChar char="•"/>
             </a:pPr>
             <a:r>
-              <a:rPr lang="en-GB" sz="1400" dirty="0"/>
+              <a:rPr lang="en-GB" sz="2000" dirty="0"/>
               <a:t>Front End Developer</a:t>
             </a:r>
           </a:p>
@@ -5957,7 +5972,7 @@
               <a:buChar char="•"/>
             </a:pPr>
             <a:r>
-              <a:rPr lang="en-GB" sz="1400" dirty="0"/>
+              <a:rPr lang="en-GB" sz="2000" dirty="0"/>
               <a:t>Front End Tester</a:t>
             </a:r>
           </a:p>
@@ -5978,7 +5993,7 @@
         <p:spPr>
           <a:xfrm>
             <a:off x="6035933" y="3942129"/>
-            <a:ext cx="2521258" cy="1354217"/>
+            <a:ext cx="2521258" cy="1938992"/>
           </a:xfrm>
           <a:prstGeom prst="rect">
             <a:avLst/>
@@ -5993,17 +6008,17 @@
           <a:p>
             <a:pPr algn="ctr"/>
             <a:r>
-              <a:rPr lang="en-GB" dirty="0"/>
+              <a:rPr lang="en-GB" sz="2000" dirty="0"/>
               <a:t>Méabh Gibney</a:t>
             </a:r>
           </a:p>
           <a:p>
             <a:pPr algn="ctr"/>
-            <a:endParaRPr lang="en-GB" dirty="0"/>
-          </a:p>
-          <a:p>
-            <a:r>
-              <a:rPr lang="en-GB" dirty="0"/>
+            <a:endParaRPr lang="en-GB" sz="2000" dirty="0"/>
+          </a:p>
+          <a:p>
+            <a:r>
+              <a:rPr lang="en-GB" sz="2000" dirty="0"/>
               <a:t>Roles</a:t>
             </a:r>
           </a:p>
@@ -6013,7 +6028,7 @@
               <a:buChar char="•"/>
             </a:pPr>
             <a:r>
-              <a:rPr lang="en-GB" sz="1400" dirty="0"/>
+              <a:rPr lang="en-GB" sz="2000" dirty="0"/>
               <a:t>Back End Developer</a:t>
             </a:r>
           </a:p>
@@ -6023,7 +6038,7 @@
               <a:buChar char="•"/>
             </a:pPr>
             <a:r>
-              <a:rPr lang="en-GB" sz="1400" dirty="0"/>
+              <a:rPr lang="en-GB" sz="2000" dirty="0"/>
               <a:t>Database Developer</a:t>
             </a:r>
           </a:p>
@@ -6044,7 +6059,7 @@
         <p:spPr>
           <a:xfrm>
             <a:off x="8636442" y="3942129"/>
-            <a:ext cx="2521258" cy="1569660"/>
+            <a:ext cx="2521258" cy="1938992"/>
           </a:xfrm>
           <a:prstGeom prst="rect">
             <a:avLst/>
@@ -6059,17 +6074,17 @@
           <a:p>
             <a:pPr algn="ctr"/>
             <a:r>
-              <a:rPr lang="en-GB" dirty="0"/>
+              <a:rPr lang="en-GB" sz="2000" dirty="0"/>
               <a:t>Jordan Conway</a:t>
             </a:r>
           </a:p>
           <a:p>
             <a:pPr algn="ctr"/>
-            <a:endParaRPr lang="en-GB" dirty="0"/>
-          </a:p>
-          <a:p>
-            <a:r>
-              <a:rPr lang="en-GB" dirty="0"/>
+            <a:endParaRPr lang="en-GB" sz="2000" dirty="0"/>
+          </a:p>
+          <a:p>
+            <a:r>
+              <a:rPr lang="en-GB" sz="2000" dirty="0"/>
               <a:t>Roles</a:t>
             </a:r>
           </a:p>
@@ -6079,7 +6094,7 @@
               <a:buChar char="•"/>
             </a:pPr>
             <a:r>
-              <a:rPr lang="en-GB" sz="1400" dirty="0"/>
+              <a:rPr lang="en-GB" sz="2000" dirty="0"/>
               <a:t>Back End Developer</a:t>
             </a:r>
           </a:p>
@@ -6089,7 +6104,7 @@
               <a:buChar char="•"/>
             </a:pPr>
             <a:r>
-              <a:rPr lang="en-GB" sz="1400" dirty="0"/>
+              <a:rPr lang="en-GB" sz="2000" dirty="0"/>
               <a:t>Hardware Engineer</a:t>
             </a:r>
           </a:p>
@@ -6099,7 +6114,7 @@
               <a:buChar char="•"/>
             </a:pPr>
             <a:r>
-              <a:rPr lang="en-GB" sz="1400" dirty="0"/>
+              <a:rPr lang="en-GB" sz="2000" dirty="0"/>
               <a:t>System Tester</a:t>
             </a:r>
           </a:p>
@@ -6164,16 +6179,14 @@
           </a:bodyPr>
           <a:lstStyle/>
           <a:p>
-            <a:pPr algn="ctr">
+            <a:pPr>
               <a:lnSpc>
                 <a:spcPct val="100000"/>
               </a:lnSpc>
               <a:buNone/>
             </a:pPr>
             <a:r>
-              <a:rPr lang="en-IE" sz="4400" b="0" strike="noStrike" spc="-1">
-                <a:latin typeface="Arial"/>
-              </a:rPr>
+              <a:rPr lang="en-IE" sz="4400" b="1" strike="noStrike" spc="-1" dirty="0"/>
               <a:t>Data Processing</a:t>
             </a:r>
           </a:p>
@@ -6223,18 +6236,15 @@
               <a:buNone/>
             </a:pPr>
             <a:r>
-              <a:rPr lang="en-IE" sz="1800" b="0" strike="noStrike" spc="-1">
+              <a:rPr lang="en-IE" sz="2400" b="0" strike="noStrike" spc="-1" dirty="0">
                 <a:solidFill>
                   <a:srgbClr val="000000"/>
                 </a:solidFill>
-                <a:latin typeface="Arial"/>
                 <a:ea typeface="DejaVu Sans"/>
               </a:rPr>
               <a:t>Sensor data will be processed locally.</a:t>
             </a:r>
-            <a:endParaRPr lang="en-IE" sz="1800" b="0" strike="noStrike" spc="-1">
-              <a:latin typeface="Arial"/>
-            </a:endParaRPr>
+            <a:endParaRPr lang="en-IE" sz="2400" b="0" strike="noStrike" spc="-1" dirty="0"/>
           </a:p>
           <a:p>
             <a:pPr>
@@ -6244,18 +6254,15 @@
               <a:buNone/>
             </a:pPr>
             <a:r>
-              <a:rPr lang="en-IE" sz="1800" b="0" strike="noStrike" spc="-1">
+              <a:rPr lang="en-IE" sz="2400" b="0" strike="noStrike" spc="-1" dirty="0">
                 <a:solidFill>
                   <a:srgbClr val="000000"/>
                 </a:solidFill>
-                <a:latin typeface="Arial"/>
                 <a:ea typeface="DejaVu Sans"/>
               </a:rPr>
               <a:t>Notifications and medication history will be process on the AWS server.</a:t>
             </a:r>
-            <a:endParaRPr lang="en-IE" sz="1800" b="0" strike="noStrike" spc="-1">
-              <a:latin typeface="Arial"/>
-            </a:endParaRPr>
+            <a:endParaRPr lang="en-IE" sz="2400" b="0" strike="noStrike" spc="-1" dirty="0"/>
           </a:p>
           <a:p>
             <a:pPr>
@@ -6265,18 +6272,15 @@
               <a:buNone/>
             </a:pPr>
             <a:r>
-              <a:rPr lang="en-IE" sz="1800" b="0" strike="noStrike" spc="-1">
+              <a:rPr lang="en-IE" sz="2400" b="0" strike="noStrike" spc="-1" dirty="0">
                 <a:solidFill>
                   <a:srgbClr val="000000"/>
                 </a:solidFill>
-                <a:latin typeface="Arial"/>
                 <a:ea typeface="DejaVu Sans"/>
               </a:rPr>
               <a:t>Notifications will be sent to the users’ devices by AWS server.</a:t>
             </a:r>
-            <a:endParaRPr lang="en-IE" sz="1800" b="0" strike="noStrike" spc="-1">
-              <a:latin typeface="Arial"/>
-            </a:endParaRPr>
+            <a:endParaRPr lang="en-IE" sz="2400" b="0" strike="noStrike" spc="-1" dirty="0"/>
           </a:p>
           <a:p>
             <a:pPr>
@@ -6286,18 +6290,15 @@
               <a:buNone/>
             </a:pPr>
             <a:r>
-              <a:rPr lang="en-IE" sz="1800" b="0" strike="noStrike" spc="-1">
+              <a:rPr lang="en-IE" sz="2400" b="0" strike="noStrike" spc="-1" dirty="0">
                 <a:solidFill>
                   <a:srgbClr val="000000"/>
                 </a:solidFill>
-                <a:latin typeface="Arial"/>
                 <a:ea typeface="DejaVu Sans"/>
               </a:rPr>
               <a:t>Medication data will be edited on the web client before being sent to AWS server.</a:t>
             </a:r>
-            <a:endParaRPr lang="en-IE" sz="1800" b="0" strike="noStrike" spc="-1">
-              <a:latin typeface="Arial"/>
-            </a:endParaRPr>
+            <a:endParaRPr lang="en-IE" sz="2400" b="0" strike="noStrike" spc="-1" dirty="0"/>
           </a:p>
           <a:p>
             <a:pPr>
@@ -6306,9 +6307,7 @@
               </a:lnSpc>
               <a:buNone/>
             </a:pPr>
-            <a:endParaRPr lang="en-IE" sz="1800" b="0" strike="noStrike" spc="-1">
-              <a:latin typeface="Arial"/>
-            </a:endParaRPr>
+            <a:endParaRPr lang="en-IE" sz="2400" b="0" strike="noStrike" spc="-1" dirty="0"/>
           </a:p>
           <a:p>
             <a:pPr>
@@ -6318,18 +6317,15 @@
               <a:buNone/>
             </a:pPr>
             <a:r>
-              <a:rPr lang="en-IE" sz="1800" b="0" strike="noStrike" spc="-1">
+              <a:rPr lang="en-IE" sz="2400" b="0" strike="noStrike" spc="-1" dirty="0">
                 <a:solidFill>
                   <a:srgbClr val="000000"/>
                 </a:solidFill>
-                <a:latin typeface="Arial"/>
                 <a:ea typeface="DejaVu Sans"/>
               </a:rPr>
               <a:t>The data will be processed to record if medication was taken on time, a dose was missed and if the medication box will require a refill.</a:t>
             </a:r>
-            <a:endParaRPr lang="en-IE" sz="1800" b="0" strike="noStrike" spc="-1">
-              <a:latin typeface="Arial"/>
-            </a:endParaRPr>
+            <a:endParaRPr lang="en-IE" sz="2400" b="0" strike="noStrike" spc="-1" dirty="0"/>
           </a:p>
           <a:p>
             <a:pPr>
@@ -6338,9 +6334,7 @@
               </a:lnSpc>
               <a:buNone/>
             </a:pPr>
-            <a:endParaRPr lang="en-IE" sz="1800" b="0" strike="noStrike" spc="-1">
-              <a:latin typeface="Arial"/>
-            </a:endParaRPr>
+            <a:endParaRPr lang="en-IE" sz="2400" b="0" strike="noStrike" spc="-1" dirty="0"/>
           </a:p>
           <a:p>
             <a:pPr>
@@ -6350,18 +6344,15 @@
               <a:buNone/>
             </a:pPr>
             <a:r>
-              <a:rPr lang="en-IE" sz="1800" b="0" strike="noStrike" spc="-1">
+              <a:rPr lang="en-IE" sz="2400" b="0" strike="noStrike" spc="-1" dirty="0">
                 <a:solidFill>
                   <a:srgbClr val="000000"/>
                 </a:solidFill>
-                <a:latin typeface="Arial"/>
                 <a:ea typeface="DejaVu Sans"/>
               </a:rPr>
               <a:t>A CRON job will be running to restart the program if it has stopped.</a:t>
             </a:r>
-            <a:endParaRPr lang="en-IE" sz="1800" b="0" strike="noStrike" spc="-1">
-              <a:latin typeface="Arial"/>
-            </a:endParaRPr>
+            <a:endParaRPr lang="en-IE" sz="2400" b="0" strike="noStrike" spc="-1" dirty="0"/>
           </a:p>
           <a:p>
             <a:pPr>
@@ -6370,7 +6361,7 @@
               </a:lnSpc>
               <a:buNone/>
             </a:pPr>
-            <a:endParaRPr lang="en-IE" sz="1800" b="0" strike="noStrike" spc="-1">
+            <a:endParaRPr lang="en-IE" sz="1800" b="0" strike="noStrike" spc="-1" dirty="0">
               <a:latin typeface="Arial"/>
             </a:endParaRPr>
           </a:p>
@@ -6430,13 +6421,11 @@
           </a:bodyPr>
           <a:lstStyle/>
           <a:p>
-            <a:pPr algn="ctr">
-              <a:buNone/>
-            </a:pPr>
-            <a:r>
-              <a:rPr lang="en-IE" sz="4400" b="0" strike="noStrike" spc="-1">
-                <a:latin typeface="Arial"/>
-              </a:rPr>
+            <a:pPr>
+              <a:buNone/>
+            </a:pPr>
+            <a:r>
+              <a:rPr lang="en-IE" sz="4400" b="1" strike="noStrike" spc="-1" dirty="0"/>
               <a:t>Data Processing – Example Queries</a:t>
             </a:r>
           </a:p>
@@ -6491,9 +6480,7 @@
           <a:lstStyle/>
           <a:p>
             <a:r>
-              <a:rPr lang="en-IE" sz="1800" b="0" strike="noStrike" spc="-1">
-                <a:latin typeface="Arial"/>
-              </a:rPr>
+              <a:rPr lang="en-IE" sz="2400" b="0" strike="noStrike" spc="-1" dirty="0"/>
               <a:t>Find all entries where the user has missed a dose.</a:t>
             </a:r>
           </a:p>
@@ -6548,10 +6535,16 @@
           <a:lstStyle/>
           <a:p>
             <a:r>
-              <a:rPr lang="en-IE" sz="1800" b="0" strike="noStrike" spc="-1">
-                <a:latin typeface="Arial"/>
-              </a:rPr>
-              <a:t>Get the 30 most recent histroy entries.</a:t>
+              <a:rPr lang="en-IE" sz="2400" b="0" strike="noStrike" spc="-1" dirty="0"/>
+              <a:t>Get the 30 most recent </a:t>
+            </a:r>
+            <a:r>
+              <a:rPr lang="en-IE" sz="2400" b="0" strike="noStrike" spc="-1" dirty="0" err="1"/>
+              <a:t>histroy</a:t>
+            </a:r>
+            <a:r>
+              <a:rPr lang="en-IE" sz="2400" b="0" strike="noStrike" spc="-1" dirty="0"/>
+              <a:t> entries.</a:t>
             </a:r>
           </a:p>
         </p:txBody>
@@ -6605,9 +6598,7 @@
           <a:lstStyle/>
           <a:p>
             <a:r>
-              <a:rPr lang="en-IE" sz="1800" b="0" strike="noStrike" spc="-1">
-                <a:latin typeface="Arial"/>
-              </a:rPr>
+              <a:rPr lang="en-IE" sz="2400" b="0" strike="noStrike" spc="-1" dirty="0"/>
               <a:t>Get the next 5 entries in the users schedule.</a:t>
             </a:r>
           </a:p>
@@ -6667,16 +6658,14 @@
           </a:bodyPr>
           <a:lstStyle/>
           <a:p>
-            <a:pPr algn="ctr">
+            <a:pPr>
               <a:lnSpc>
                 <a:spcPct val="100000"/>
               </a:lnSpc>
               <a:buNone/>
             </a:pPr>
             <a:r>
-              <a:rPr lang="en-IE" sz="4400" b="0" strike="noStrike" spc="-1">
-                <a:latin typeface="Arial"/>
-              </a:rPr>
+              <a:rPr lang="en-IE" sz="4400" b="1" strike="noStrike" spc="-1" dirty="0"/>
               <a:t>Data Security</a:t>
             </a:r>
           </a:p>
@@ -6726,18 +6715,15 @@
               <a:buNone/>
             </a:pPr>
             <a:r>
-              <a:rPr lang="en-IE" sz="1800" b="0" strike="noStrike" spc="-1">
+              <a:rPr lang="en-IE" sz="2400" b="0" strike="noStrike" spc="-1" dirty="0">
                 <a:solidFill>
                   <a:srgbClr val="000000"/>
                 </a:solidFill>
-                <a:latin typeface="Arial"/>
                 <a:ea typeface="DejaVu Sans"/>
               </a:rPr>
               <a:t>Data will be transferred between the device, server and web/mobile client by HTTPS.</a:t>
             </a:r>
-            <a:endParaRPr lang="en-IE" sz="1800" b="0" strike="noStrike" spc="-1">
-              <a:latin typeface="Arial"/>
-            </a:endParaRPr>
+            <a:endParaRPr lang="en-IE" sz="2400" b="0" strike="noStrike" spc="-1" dirty="0"/>
           </a:p>
           <a:p>
             <a:pPr>
@@ -6747,18 +6733,15 @@
               <a:buNone/>
             </a:pPr>
             <a:r>
-              <a:rPr lang="en-IE" sz="1800" b="0" strike="noStrike" spc="-1">
+              <a:rPr lang="en-IE" sz="2400" b="0" strike="noStrike" spc="-1" dirty="0">
                 <a:solidFill>
                   <a:srgbClr val="000000"/>
                 </a:solidFill>
-                <a:latin typeface="Arial"/>
                 <a:ea typeface="DejaVu Sans"/>
               </a:rPr>
               <a:t>HTTP GET will only be used to retrieved data.</a:t>
             </a:r>
-            <a:endParaRPr lang="en-IE" sz="1800" b="0" strike="noStrike" spc="-1">
-              <a:latin typeface="Arial"/>
-            </a:endParaRPr>
+            <a:endParaRPr lang="en-IE" sz="2400" b="0" strike="noStrike" spc="-1" dirty="0"/>
           </a:p>
           <a:p>
             <a:pPr>
@@ -6768,18 +6751,15 @@
               <a:buNone/>
             </a:pPr>
             <a:r>
-              <a:rPr lang="en-IE" sz="1800" b="0" strike="noStrike" spc="-1">
+              <a:rPr lang="en-IE" sz="2400" b="0" strike="noStrike" spc="-1" dirty="0">
                 <a:solidFill>
                   <a:srgbClr val="000000"/>
                 </a:solidFill>
-                <a:latin typeface="Arial"/>
                 <a:ea typeface="DejaVu Sans"/>
               </a:rPr>
               <a:t>HTTP POST or PUT will be used to enter or update data.</a:t>
             </a:r>
-            <a:endParaRPr lang="en-IE" sz="1800" b="0" strike="noStrike" spc="-1">
-              <a:latin typeface="Arial"/>
-            </a:endParaRPr>
+            <a:endParaRPr lang="en-IE" sz="2400" b="0" strike="noStrike" spc="-1" dirty="0"/>
           </a:p>
           <a:p>
             <a:pPr>
@@ -6788,9 +6768,7 @@
               </a:lnSpc>
               <a:buNone/>
             </a:pPr>
-            <a:endParaRPr lang="en-IE" sz="1800" b="0" strike="noStrike" spc="-1">
-              <a:latin typeface="Arial"/>
-            </a:endParaRPr>
+            <a:endParaRPr lang="en-IE" sz="2400" b="0" strike="noStrike" spc="-1" dirty="0"/>
           </a:p>
           <a:p>
             <a:pPr>
@@ -6800,18 +6778,15 @@
               <a:buNone/>
             </a:pPr>
             <a:r>
-              <a:rPr lang="en-IE" sz="1800" b="0" strike="noStrike" spc="-1">
+              <a:rPr lang="en-IE" sz="2400" b="0" strike="noStrike" spc="-1" dirty="0">
                 <a:solidFill>
                   <a:srgbClr val="000000"/>
                 </a:solidFill>
-                <a:latin typeface="Arial"/>
                 <a:ea typeface="DejaVu Sans"/>
               </a:rPr>
               <a:t>Sensitive data, such as medication information, will only be stored as encrypted data.</a:t>
             </a:r>
-            <a:endParaRPr lang="en-IE" sz="1800" b="0" strike="noStrike" spc="-1">
-              <a:latin typeface="Arial"/>
-            </a:endParaRPr>
+            <a:endParaRPr lang="en-IE" sz="2400" b="0" strike="noStrike" spc="-1" dirty="0"/>
           </a:p>
           <a:p>
             <a:pPr>
@@ -6821,18 +6796,15 @@
               <a:buNone/>
             </a:pPr>
             <a:r>
-              <a:rPr lang="en-IE" sz="1800" b="0" strike="noStrike" spc="-1">
+              <a:rPr lang="en-IE" sz="2400" b="0" strike="noStrike" spc="-1" dirty="0">
                 <a:solidFill>
                   <a:srgbClr val="000000"/>
                 </a:solidFill>
-                <a:latin typeface="Arial"/>
                 <a:ea typeface="DejaVu Sans"/>
               </a:rPr>
               <a:t>End to end encryption will be used to ensure only the user as access to sensitive data in a decrypted form.</a:t>
             </a:r>
-            <a:endParaRPr lang="en-IE" sz="1800" b="0" strike="noStrike" spc="-1">
-              <a:latin typeface="Arial"/>
-            </a:endParaRPr>
+            <a:endParaRPr lang="en-IE" sz="2400" b="0" strike="noStrike" spc="-1" dirty="0"/>
           </a:p>
           <a:p>
             <a:pPr>
@@ -6842,18 +6814,15 @@
               <a:buNone/>
             </a:pPr>
             <a:r>
-              <a:rPr lang="en-IE" sz="1800" b="0" strike="noStrike" spc="-1">
+              <a:rPr lang="en-IE" sz="2400" b="0" strike="noStrike" spc="-1" dirty="0">
                 <a:solidFill>
                   <a:srgbClr val="000000"/>
                 </a:solidFill>
-                <a:latin typeface="Arial"/>
                 <a:ea typeface="DejaVu Sans"/>
               </a:rPr>
               <a:t>The database will be stored on a AWS server.</a:t>
             </a:r>
-            <a:endParaRPr lang="en-IE" sz="1800" b="0" strike="noStrike" spc="-1">
-              <a:latin typeface="Arial"/>
-            </a:endParaRPr>
+            <a:endParaRPr lang="en-IE" sz="2400" b="0" strike="noStrike" spc="-1" dirty="0"/>
           </a:p>
           <a:p>
             <a:pPr>
@@ -6863,18 +6832,15 @@
               <a:buNone/>
             </a:pPr>
             <a:r>
-              <a:rPr lang="en-IE" sz="1800" b="0" strike="noStrike" spc="-1">
+              <a:rPr lang="en-IE" sz="2400" b="0" strike="noStrike" spc="-1" dirty="0">
                 <a:solidFill>
                   <a:srgbClr val="000000"/>
                 </a:solidFill>
-                <a:latin typeface="Arial"/>
                 <a:ea typeface="DejaVu Sans"/>
               </a:rPr>
               <a:t>Only times to take medication and which specific box it is stored in will be stored locally.</a:t>
             </a:r>
-            <a:endParaRPr lang="en-IE" sz="1800" b="0" strike="noStrike" spc="-1">
-              <a:latin typeface="Arial"/>
-            </a:endParaRPr>
+            <a:endParaRPr lang="en-IE" sz="2400" b="0" strike="noStrike" spc="-1" dirty="0"/>
           </a:p>
           <a:p>
             <a:pPr>
@@ -6884,18 +6850,15 @@
               <a:buNone/>
             </a:pPr>
             <a:r>
-              <a:rPr lang="en-IE" sz="1800" b="0" strike="noStrike" spc="-1">
+              <a:rPr lang="en-IE" sz="2400" b="0" strike="noStrike" spc="-1" dirty="0">
                 <a:solidFill>
                   <a:srgbClr val="000000"/>
                 </a:solidFill>
-                <a:latin typeface="Arial"/>
                 <a:ea typeface="DejaVu Sans"/>
               </a:rPr>
               <a:t>If sensor data is required to be stored locally due to an inability to communicate with the server, it will be wiped after the connection is reestablished and the updates are applied.</a:t>
             </a:r>
-            <a:endParaRPr lang="en-IE" sz="1800" b="0" strike="noStrike" spc="-1">
-              <a:latin typeface="Arial"/>
-            </a:endParaRPr>
+            <a:endParaRPr lang="en-IE" sz="2400" b="0" strike="noStrike" spc="-1" dirty="0"/>
           </a:p>
         </p:txBody>
       </p:sp>
@@ -6946,10 +6909,10 @@
           <a:lstStyle/>
           <a:p>
             <a:r>
-              <a:rPr lang="en-US" dirty="0"/>
+              <a:rPr lang="en-US" b="1" dirty="0"/>
               <a:t>Structure of User Test</a:t>
             </a:r>
-            <a:endParaRPr lang="en-GB" dirty="0"/>
+            <a:endParaRPr lang="en-GB" b="1" dirty="0"/>
           </a:p>
         </p:txBody>
       </p:sp>
@@ -6971,31 +6934,33 @@
         </p:nvSpPr>
         <p:spPr/>
         <p:txBody>
-          <a:bodyPr/>
-          <a:lstStyle/>
-          <a:p>
-            <a:r>
-              <a:rPr lang="en-US" dirty="0"/>
+          <a:bodyPr>
+            <a:normAutofit/>
+          </a:bodyPr>
+          <a:lstStyle/>
+          <a:p>
+            <a:r>
+              <a:rPr lang="en-US" sz="2400" dirty="0"/>
               <a:t>We will have structured tests with one person, in which metrics are used to reveal where the app excels or falls short</a:t>
             </a:r>
           </a:p>
           <a:p>
             <a:r>
-              <a:rPr lang="en-US" dirty="0"/>
+              <a:rPr lang="en-US" sz="2400" dirty="0"/>
               <a:t>They will be monitored to assess their outwardly visible experience with the app, and their interactions will be </a:t>
             </a:r>
             <a:r>
-              <a:rPr lang="en-GB" dirty="0"/>
+              <a:rPr lang="en-GB" sz="2400" dirty="0"/>
               <a:t>analysed</a:t>
             </a:r>
             <a:r>
-              <a:rPr lang="en-US" dirty="0"/>
+              <a:rPr lang="en-US" sz="2400" dirty="0"/>
               <a:t>.</a:t>
             </a:r>
           </a:p>
           <a:p>
             <a:r>
-              <a:rPr lang="en-US" dirty="0"/>
+              <a:rPr lang="en-US" sz="2400" dirty="0"/>
               <a:t>After the test, there will be a questionnaire that is intended to reveal the user’s internal thoughts and experiences</a:t>
             </a:r>
           </a:p>
@@ -7053,10 +7018,10 @@
           <a:lstStyle/>
           <a:p>
             <a:r>
-              <a:rPr lang="en-US" dirty="0"/>
+              <a:rPr lang="en-US" b="1" dirty="0"/>
               <a:t>Metrics of User Test</a:t>
             </a:r>
-            <a:endParaRPr lang="en-GB" dirty="0"/>
+            <a:endParaRPr lang="en-GB" b="1" dirty="0"/>
           </a:p>
         </p:txBody>
       </p:sp>
@@ -7072,7 +7037,13 @@
           <p:cNvGraphicFramePr>
             <a:graphicFrameLocks noGrp="1"/>
           </p:cNvGraphicFramePr>
-          <p:nvPr/>
+          <p:nvPr>
+            <p:extLst>
+              <p:ext uri="{D42A27DB-BD31-4B8C-83A1-F6EECF244321}">
+                <p14:modId xmlns:p14="http://schemas.microsoft.com/office/powerpoint/2010/main" val="1528296952"/>
+              </p:ext>
+            </p:extLst>
+          </p:nvPr>
         </p:nvGraphicFramePr>
         <p:xfrm>
           <a:off x="1052051" y="1474840"/>
@@ -7403,10 +7374,10 @@
           <a:lstStyle/>
           <a:p>
             <a:r>
-              <a:rPr lang="en-US" dirty="0"/>
+              <a:rPr lang="en-US" b="1" dirty="0"/>
               <a:t>Life Cycle of User Tests</a:t>
             </a:r>
-            <a:endParaRPr lang="en-GB" dirty="0"/>
+            <a:endParaRPr lang="en-GB" b="1" dirty="0"/>
           </a:p>
         </p:txBody>
       </p:sp>
@@ -7435,7 +7406,7 @@
               <a:buNone/>
             </a:pPr>
             <a:r>
-              <a:rPr lang="en-US" dirty="0"/>
+              <a:rPr lang="en-US" sz="2400" dirty="0"/>
               <a:t>Here are the planned steps to our future tests</a:t>
             </a:r>
           </a:p>
@@ -7445,7 +7416,7 @@
               <a:buAutoNum type="arabicPeriod"/>
             </a:pPr>
             <a:r>
-              <a:rPr lang="en-US" dirty="0"/>
+              <a:rPr lang="en-US" sz="2400" dirty="0"/>
               <a:t>Find a suitable person to act as a user</a:t>
             </a:r>
           </a:p>
@@ -7455,7 +7426,7 @@
               <a:buAutoNum type="arabicPeriod"/>
             </a:pPr>
             <a:r>
-              <a:rPr lang="en-US" dirty="0"/>
+              <a:rPr lang="en-US" sz="2400" dirty="0"/>
               <a:t>Conduct an evaluation of the product UI/hardware</a:t>
             </a:r>
           </a:p>
@@ -7465,7 +7436,7 @@
               <a:buAutoNum type="arabicPeriod"/>
             </a:pPr>
             <a:r>
-              <a:rPr lang="en-US" dirty="0"/>
+              <a:rPr lang="en-US" sz="2400" dirty="0"/>
               <a:t>Perform an interview with the user</a:t>
             </a:r>
           </a:p>
@@ -7475,11 +7446,11 @@
               <a:buAutoNum type="arabicPeriod"/>
             </a:pPr>
             <a:r>
-              <a:rPr lang="en-US" dirty="0" err="1"/>
+              <a:rPr lang="en-US" sz="2400" dirty="0" err="1"/>
               <a:t>Analyse</a:t>
             </a:r>
             <a:r>
-              <a:rPr lang="en-US" dirty="0"/>
+              <a:rPr lang="en-US" sz="2400" dirty="0"/>
               <a:t> results and guide project development with findings</a:t>
             </a:r>
           </a:p>
@@ -7489,14 +7460,9 @@
               <a:buAutoNum type="arabicPeriod"/>
             </a:pPr>
             <a:r>
-              <a:rPr lang="en-US" dirty="0"/>
-              <a:t>Repeat 1-4 until development </a:t>
-            </a:r>
-            <a:r>
-              <a:rPr lang="en-US"/>
-              <a:t>is complete!</a:t>
-            </a:r>
-            <a:endParaRPr lang="en-US" dirty="0"/>
+              <a:rPr lang="en-US" sz="2400" dirty="0"/>
+              <a:t>Repeat 1-4 until development is complete!</a:t>
+            </a:r>
           </a:p>
           <a:p>
             <a:pPr marL="514350" indent="-514350">
@@ -7565,7 +7531,7 @@
           <a:lstStyle/>
           <a:p>
             <a:r>
-              <a:rPr lang="en-GB" dirty="0"/>
+              <a:rPr lang="en-GB" b="1" dirty="0"/>
               <a:t>Get to know the idea</a:t>
             </a:r>
           </a:p>
@@ -7597,32 +7563,17 @@
               <a:buChar char="•"/>
             </a:pPr>
             <a:r>
-              <a:rPr lang="en-US" sz="1800" b="0" i="0" u="none" strike="noStrike" dirty="0">
-                <a:solidFill>
-                  <a:srgbClr val="404040"/>
-                </a:solidFill>
+              <a:rPr lang="en-US" sz="2400" b="0" i="0" u="none" strike="noStrike" dirty="0">
                 <a:effectLst/>
-                <a:latin typeface="Trebuchet MS" panose="020B0603020202020204" pitchFamily="34" charset="0"/>
               </a:rPr>
               <a:t>We wish to improve the current landscape of medication boxes, by adding an IoT system on top of existing implementations.</a:t>
             </a:r>
             <a:r>
-              <a:rPr lang="en-US" sz="1800" b="0" i="0" dirty="0">
-                <a:solidFill>
-                  <a:srgbClr val="404040"/>
-                </a:solidFill>
+              <a:rPr lang="en-US" sz="2400" b="0" i="0" dirty="0">
                 <a:effectLst/>
-                <a:latin typeface="Trebuchet MS" panose="020B0603020202020204" pitchFamily="34" charset="0"/>
               </a:rPr>
               <a:t>​</a:t>
             </a:r>
-            <a:endParaRPr lang="en-US" b="0" i="0" dirty="0">
-              <a:solidFill>
-                <a:srgbClr val="000000"/>
-              </a:solidFill>
-              <a:effectLst/>
-              <a:latin typeface="Arial" panose="020B0604020202020204" pitchFamily="34" charset="0"/>
-            </a:endParaRPr>
           </a:p>
           <a:p>
             <a:pPr algn="l" rtl="0" fontAlgn="base">
@@ -7630,32 +7581,17 @@
               <a:buChar char="•"/>
             </a:pPr>
             <a:r>
-              <a:rPr lang="en-US" sz="1800" b="0" i="0" u="none" strike="noStrike" dirty="0">
-                <a:solidFill>
-                  <a:srgbClr val="404040"/>
-                </a:solidFill>
+              <a:rPr lang="en-US" sz="2400" b="0" i="0" u="none" strike="noStrike" dirty="0">
                 <a:effectLst/>
-                <a:latin typeface="Trebuchet MS" panose="020B0603020202020204" pitchFamily="34" charset="0"/>
               </a:rPr>
               <a:t>This will allow users to effectively keep track of what medication they should or shouldn’t take.</a:t>
             </a:r>
             <a:r>
-              <a:rPr lang="en-US" sz="1800" b="0" i="0" dirty="0">
-                <a:solidFill>
-                  <a:srgbClr val="404040"/>
-                </a:solidFill>
+              <a:rPr lang="en-US" sz="2400" b="0" i="0" dirty="0">
                 <a:effectLst/>
-                <a:latin typeface="Trebuchet MS" panose="020B0603020202020204" pitchFamily="34" charset="0"/>
               </a:rPr>
               <a:t>​</a:t>
             </a:r>
-            <a:endParaRPr lang="en-US" b="0" i="0" dirty="0">
-              <a:solidFill>
-                <a:srgbClr val="000000"/>
-              </a:solidFill>
-              <a:effectLst/>
-              <a:latin typeface="Arial" panose="020B0604020202020204" pitchFamily="34" charset="0"/>
-            </a:endParaRPr>
           </a:p>
           <a:p>
             <a:pPr algn="l" rtl="0" fontAlgn="base">
@@ -7663,12 +7599,8 @@
               <a:buChar char="•"/>
             </a:pPr>
             <a:r>
-              <a:rPr lang="en-US" sz="1800" b="0" i="0" u="none" strike="noStrike" dirty="0">
-                <a:solidFill>
-                  <a:srgbClr val="404040"/>
-                </a:solidFill>
+              <a:rPr lang="en-US" sz="2400" b="0" i="0" u="none" strike="noStrike" dirty="0">
                 <a:effectLst/>
-                <a:latin typeface="Trebuchet MS" panose="020B0603020202020204" pitchFamily="34" charset="0"/>
               </a:rPr>
               <a:t>This information will be conveyed through hardware and notifications.</a:t>
             </a:r>
@@ -7679,52 +7611,17 @@
               <a:buChar char="•"/>
             </a:pPr>
             <a:r>
-              <a:rPr lang="en-US" sz="1800" b="0" i="0" dirty="0">
-                <a:solidFill>
-                  <a:srgbClr val="404040"/>
-                </a:solidFill>
+              <a:rPr lang="en-US" sz="2400" b="0" i="0" dirty="0">
                 <a:effectLst/>
-                <a:latin typeface="Trebuchet MS" panose="020B0603020202020204" pitchFamily="34" charset="0"/>
               </a:rPr>
               <a:t>Users who are forgetful or stressed may benefit from our </a:t>
             </a:r>
             <a:r>
-              <a:rPr lang="en-GB" sz="1800" b="0" i="0" dirty="0">
-                <a:solidFill>
-                  <a:srgbClr val="404040"/>
-                </a:solidFill>
+              <a:rPr lang="en-GB" sz="2400" b="0" i="0" dirty="0">
                 <a:effectLst/>
-                <a:latin typeface="Trebuchet MS" panose="020B0603020202020204" pitchFamily="34" charset="0"/>
               </a:rPr>
-              <a:t>idea, as the resulting product should provide timely, easy-to-digest notifications. This will </a:t>
-            </a:r>
-            <a:r>
-              <a:rPr lang="en-GB" sz="1800" b="0" i="0">
-                <a:solidFill>
-                  <a:srgbClr val="404040"/>
-                </a:solidFill>
-                <a:effectLst/>
-                <a:latin typeface="Trebuchet MS" panose="020B0603020202020204" pitchFamily="34" charset="0"/>
-              </a:rPr>
-              <a:t>help lighten the </a:t>
-            </a:r>
-            <a:r>
-              <a:rPr lang="en-GB" sz="1800" b="0" i="0" dirty="0">
-                <a:solidFill>
-                  <a:srgbClr val="404040"/>
-                </a:solidFill>
-                <a:effectLst/>
-                <a:latin typeface="Trebuchet MS" panose="020B0603020202020204" pitchFamily="34" charset="0"/>
-              </a:rPr>
-              <a:t>burden of managing medication off the user’s mind.</a:t>
-            </a:r>
-            <a:endParaRPr lang="en-GB" b="0" i="0" dirty="0">
-              <a:solidFill>
-                <a:srgbClr val="000000"/>
-              </a:solidFill>
-              <a:effectLst/>
-              <a:latin typeface="Arial" panose="020B0604020202020204" pitchFamily="34" charset="0"/>
-            </a:endParaRPr>
+              <a:t>idea, as the resulting product should provide timely, easy-to-digest notifications. This will help lighten the burden of managing medication off the user’s mind.</a:t>
+            </a:r>
           </a:p>
           <a:p>
             <a:endParaRPr lang="en-GB" dirty="0"/>
@@ -7783,10 +7680,10 @@
           <a:lstStyle/>
           <a:p>
             <a:r>
-              <a:rPr lang="en-US" dirty="0"/>
+              <a:rPr lang="en-US" b="1" dirty="0"/>
               <a:t>Functionality M &amp; S</a:t>
             </a:r>
-            <a:endParaRPr lang="en-IE" dirty="0"/>
+            <a:endParaRPr lang="en-IE" b="1" dirty="0"/>
           </a:p>
         </p:txBody>
       </p:sp>
@@ -8140,7 +8037,7 @@
           <a:lstStyle/>
           <a:p>
             <a:r>
-              <a:rPr lang="en-IE" dirty="0"/>
+              <a:rPr lang="en-IE" b="1" dirty="0"/>
               <a:t>Functionality C &amp; W</a:t>
             </a:r>
           </a:p>
@@ -8321,7 +8218,7 @@
         <p:spPr>
           <a:xfrm>
             <a:off x="595435" y="2237900"/>
-            <a:ext cx="5257799" cy="2677656"/>
+            <a:ext cx="5257799" cy="2308324"/>
           </a:xfrm>
           <a:prstGeom prst="rect">
             <a:avLst/>
@@ -8339,7 +8236,7 @@
               <a:buChar char="•"/>
             </a:pPr>
             <a:r>
-              <a:rPr lang="en-US" sz="2800" dirty="0"/>
+              <a:rPr lang="en-US" sz="2400" dirty="0"/>
               <a:t>Store a record of previous days.</a:t>
             </a:r>
           </a:p>
@@ -8349,7 +8246,7 @@
               <a:buChar char="•"/>
             </a:pPr>
             <a:r>
-              <a:rPr lang="en-US" sz="2800" dirty="0"/>
+              <a:rPr lang="en-US" sz="2400" dirty="0"/>
               <a:t>Audio version of notifications.</a:t>
             </a:r>
           </a:p>
@@ -8359,7 +8256,7 @@
               <a:buChar char="•"/>
             </a:pPr>
             <a:r>
-              <a:rPr lang="en-US" sz="2800" dirty="0"/>
+              <a:rPr lang="en-US" sz="2400" dirty="0"/>
               <a:t>Locking</a:t>
             </a:r>
           </a:p>
@@ -8369,7 +8266,7 @@
               <a:buChar char="•"/>
             </a:pPr>
             <a:r>
-              <a:rPr lang="en-US" sz="2800" dirty="0"/>
+              <a:rPr lang="en-US" sz="2400" dirty="0"/>
               <a:t>It should be either portable or able to handle the user travelling without the box.</a:t>
             </a:r>
           </a:p>
@@ -8390,7 +8287,7 @@
         <p:spPr>
           <a:xfrm>
             <a:off x="5853234" y="2223044"/>
-            <a:ext cx="5257799" cy="954107"/>
+            <a:ext cx="5257799" cy="830997"/>
           </a:xfrm>
           <a:prstGeom prst="rect">
             <a:avLst/>
@@ -8408,7 +8305,7 @@
               <a:buChar char="•"/>
             </a:pPr>
             <a:r>
-              <a:rPr lang="en-US" sz="2800" dirty="0"/>
+              <a:rPr lang="en-US" sz="2400" dirty="0"/>
               <a:t>Location tracking.</a:t>
             </a:r>
           </a:p>
@@ -8418,7 +8315,7 @@
               <a:buChar char="•"/>
             </a:pPr>
             <a:r>
-              <a:rPr lang="en-US" sz="2800" dirty="0"/>
+              <a:rPr lang="en-US" sz="2400" dirty="0"/>
               <a:t>Emergency contact button.</a:t>
             </a:r>
           </a:p>
@@ -8627,7 +8524,7 @@
           <a:lstStyle/>
           <a:p>
             <a:r>
-              <a:rPr lang="en-US" sz="4000" kern="1200" dirty="0">
+              <a:rPr lang="en-US" b="1" kern="1200" dirty="0">
                 <a:solidFill>
                   <a:schemeClr val="tx1"/>
                 </a:solidFill>
@@ -8692,7 +8589,7 @@
           <a:lstStyle/>
           <a:p>
             <a:r>
-              <a:rPr lang="en-IE" dirty="0"/>
+              <a:rPr lang="en-IE" b="1" dirty="0"/>
               <a:t>How users connect</a:t>
             </a:r>
           </a:p>
@@ -8721,14 +8618,16 @@
           </a:xfrm>
         </p:spPr>
         <p:txBody>
-          <a:bodyPr/>
+          <a:bodyPr>
+            <a:normAutofit/>
+          </a:bodyPr>
           <a:lstStyle/>
           <a:p>
             <a:pPr marL="0" indent="0">
               <a:buNone/>
             </a:pPr>
             <a:r>
-              <a:rPr lang="en-IE" dirty="0"/>
+              <a:rPr lang="en-IE" sz="2400" dirty="0"/>
               <a:t>The application will absolutely start off available on desktop/laptops as most of our target audience is more comfortable with these devices. </a:t>
             </a:r>
           </a:p>
@@ -8736,14 +8635,14 @@
             <a:pPr marL="0" indent="0">
               <a:buNone/>
             </a:pPr>
-            <a:endParaRPr lang="en-IE" dirty="0"/>
+            <a:endParaRPr lang="en-IE" sz="2400" dirty="0"/>
           </a:p>
           <a:p>
             <a:pPr marL="0" indent="0">
               <a:buNone/>
             </a:pPr>
             <a:r>
-              <a:rPr lang="en-IE" dirty="0"/>
+              <a:rPr lang="en-IE" sz="2400" dirty="0"/>
               <a:t>However, many users may also be comfortable using mobile devices. Therefore, we are considering the potential of developing a progressive web app to cater for both desktop and mobile users.</a:t>
             </a:r>
           </a:p>
@@ -8808,7 +8707,7 @@
           <a:lstStyle/>
           <a:p>
             <a:r>
-              <a:rPr lang="en-IE" dirty="0"/>
+              <a:rPr lang="en-IE" b="1" dirty="0"/>
               <a:t>How we can tell if the project has been successful or not.</a:t>
             </a:r>
           </a:p>
@@ -8838,24 +8737,24 @@
         </p:spPr>
         <p:txBody>
           <a:bodyPr>
-            <a:normAutofit/>
+            <a:noAutofit/>
           </a:bodyPr>
           <a:lstStyle/>
           <a:p>
             <a:r>
-              <a:rPr lang="en-IE" sz="2000" dirty="0"/>
+              <a:rPr lang="en-IE" sz="2400" dirty="0"/>
               <a:t>To assess the success of the project we can calculate the ratio of a user's {“missed” : “true”} to {“missed : “false”}.</a:t>
             </a:r>
           </a:p>
           <a:p>
             <a:r>
-              <a:rPr lang="en-IE" sz="2000" dirty="0"/>
+              <a:rPr lang="en-IE" sz="2400" dirty="0"/>
               <a:t> If the ratio of {“missed” : “true”} to {“missed : “false”} is low, it indicates that the user has stuck to their medication regimen.</a:t>
             </a:r>
           </a:p>
           <a:p>
             <a:r>
-              <a:rPr lang="en-IE" sz="2000" dirty="0"/>
+              <a:rPr lang="en-IE" sz="2400" dirty="0"/>
               <a:t>If the ratio of {“missed” : “true”} to {“missed : “false”} is high, it indicates that the user has frequently missed taking.</a:t>
             </a:r>
           </a:p>
@@ -8959,10 +8858,10 @@
           <a:lstStyle/>
           <a:p>
             <a:r>
-              <a:rPr lang="en-US" dirty="0"/>
+              <a:rPr lang="en-US" b="1" dirty="0"/>
               <a:t>Initial UI Sketch</a:t>
             </a:r>
-            <a:endParaRPr lang="en-GB" dirty="0"/>
+            <a:endParaRPr lang="en-GB" b="1" dirty="0"/>
           </a:p>
         </p:txBody>
       </p:sp>

</xml_diff>

<commit_message>
Fix image covering text
</commit_message>
<xml_diff>
--- a/Screencast_PowerPoint.pptx
+++ b/Screencast_PowerPoint.pptx
@@ -5192,15 +5192,6 @@
               </a:lnSpc>
               <a:buNone/>
             </a:pPr>
-            <a:endParaRPr lang="en-IE" sz="2400" b="0" strike="noStrike" spc="-1" dirty="0"/>
-          </a:p>
-          <a:p>
-            <a:pPr>
-              <a:lnSpc>
-                <a:spcPct val="100000"/>
-              </a:lnSpc>
-              <a:buNone/>
-            </a:pPr>
             <a:r>
               <a:rPr lang="en-IE" sz="2400" b="0" strike="noStrike" spc="-1" dirty="0">
                 <a:solidFill>
@@ -5280,7 +5271,7 @@
         </p:blipFill>
         <p:spPr>
           <a:xfrm>
-            <a:off x="7560000" y="1416240"/>
+            <a:off x="7557840" y="765790"/>
             <a:ext cx="4020120" cy="2856600"/>
           </a:xfrm>
           <a:prstGeom prst="rect">

</xml_diff>

<commit_message>
Add physical security slide
</commit_message>
<xml_diff>
--- a/Screencast_PowerPoint.pptx
+++ b/Screencast_PowerPoint.pptx
@@ -20,16 +20,17 @@
     <p:sldId id="268" r:id="rId14"/>
     <p:sldId id="269" r:id="rId15"/>
     <p:sldId id="280" r:id="rId16"/>
-    <p:sldId id="270" r:id="rId17"/>
-    <p:sldId id="271" r:id="rId18"/>
-    <p:sldId id="272" r:id="rId19"/>
-    <p:sldId id="273" r:id="rId20"/>
-    <p:sldId id="274" r:id="rId21"/>
-    <p:sldId id="275" r:id="rId22"/>
-    <p:sldId id="276" r:id="rId23"/>
-    <p:sldId id="277" r:id="rId24"/>
-    <p:sldId id="278" r:id="rId25"/>
-    <p:sldId id="279" r:id="rId26"/>
+    <p:sldId id="282" r:id="rId17"/>
+    <p:sldId id="270" r:id="rId18"/>
+    <p:sldId id="271" r:id="rId19"/>
+    <p:sldId id="272" r:id="rId20"/>
+    <p:sldId id="273" r:id="rId21"/>
+    <p:sldId id="274" r:id="rId22"/>
+    <p:sldId id="275" r:id="rId23"/>
+    <p:sldId id="276" r:id="rId24"/>
+    <p:sldId id="277" r:id="rId25"/>
+    <p:sldId id="278" r:id="rId26"/>
+    <p:sldId id="279" r:id="rId27"/>
   </p:sldIdLst>
   <p:sldSz cx="12192000" cy="6858000"/>
   <p:notesSz cx="6858000" cy="9144000"/>
@@ -4570,6 +4571,122 @@
       </p:grpSpPr>
       <p:sp>
         <p:nvSpPr>
+          <p:cNvPr id="2" name="Title 1">
+            <a:extLst>
+              <a:ext uri="{FF2B5EF4-FFF2-40B4-BE49-F238E27FC236}">
+                <a16:creationId xmlns:a16="http://schemas.microsoft.com/office/drawing/2014/main" id="{9C033677-6058-80CC-C478-27183A73C953}"/>
+              </a:ext>
+            </a:extLst>
+          </p:cNvPr>
+          <p:cNvSpPr>
+            <a:spLocks noGrp="1"/>
+          </p:cNvSpPr>
+          <p:nvPr>
+            <p:ph type="title"/>
+          </p:nvPr>
+        </p:nvSpPr>
+        <p:spPr/>
+        <p:txBody>
+          <a:bodyPr/>
+          <a:lstStyle/>
+          <a:p>
+            <a:r>
+              <a:rPr lang="en-GB" b="1" dirty="0"/>
+              <a:t>Physical</a:t>
+            </a:r>
+            <a:r>
+              <a:rPr lang="en-GB" dirty="0"/>
+              <a:t> </a:t>
+            </a:r>
+            <a:r>
+              <a:rPr lang="en-GB" b="1" dirty="0"/>
+              <a:t>Security</a:t>
+            </a:r>
+            <a:endParaRPr lang="en-IE" b="1" dirty="0"/>
+          </a:p>
+        </p:txBody>
+      </p:sp>
+      <p:sp>
+        <p:nvSpPr>
+          <p:cNvPr id="3" name="Content Placeholder 2">
+            <a:extLst>
+              <a:ext uri="{FF2B5EF4-FFF2-40B4-BE49-F238E27FC236}">
+                <a16:creationId xmlns:a16="http://schemas.microsoft.com/office/drawing/2014/main" id="{CF990485-C4AC-24AA-836B-A016CC2B3E3F}"/>
+              </a:ext>
+            </a:extLst>
+          </p:cNvPr>
+          <p:cNvSpPr>
+            <a:spLocks noGrp="1"/>
+          </p:cNvSpPr>
+          <p:nvPr>
+            <p:ph idx="1"/>
+          </p:nvPr>
+        </p:nvSpPr>
+        <p:spPr/>
+        <p:txBody>
+          <a:bodyPr/>
+          <a:lstStyle/>
+          <a:p>
+            <a:r>
+              <a:rPr lang="en-GB" sz="2400" dirty="0"/>
+              <a:t>The hardware will be built into the box to protect it from the environment.</a:t>
+            </a:r>
+          </a:p>
+          <a:p>
+            <a:r>
+              <a:rPr lang="en-GB" sz="2400" dirty="0"/>
+              <a:t>The Pi will be mounted to the box using 4 M2.5 screws so it will not be damaged if the box is dropped or hit.</a:t>
+            </a:r>
+          </a:p>
+          <a:p>
+            <a:r>
+              <a:rPr lang="en-GB" sz="2400" dirty="0"/>
+              <a:t>We plan on blocking off ports using Linux’s IPtables command.</a:t>
+            </a:r>
+          </a:p>
+          <a:p>
+            <a:r>
+              <a:rPr lang="en-GB" sz="2400" dirty="0"/>
+              <a:t>This will stop unauthorized access to the box’s software.</a:t>
+            </a:r>
+          </a:p>
+          <a:p>
+            <a:endParaRPr lang="en-IE" dirty="0"/>
+          </a:p>
+        </p:txBody>
+      </p:sp>
+    </p:spTree>
+    <p:extLst>
+      <p:ext uri="{BB962C8B-B14F-4D97-AF65-F5344CB8AC3E}">
+        <p14:creationId xmlns:p14="http://schemas.microsoft.com/office/powerpoint/2010/main" val="3469279610"/>
+      </p:ext>
+    </p:extLst>
+  </p:cSld>
+  <p:clrMapOvr>
+    <a:masterClrMapping/>
+  </p:clrMapOvr>
+</p:sld>
+</file>
+
+<file path=ppt/slides/slide17.xml><?xml version="1.0" encoding="utf-8"?>
+<p:sld xmlns:a="http://schemas.openxmlformats.org/drawingml/2006/main" xmlns:r="http://schemas.openxmlformats.org/officeDocument/2006/relationships" xmlns:p="http://schemas.openxmlformats.org/presentationml/2006/main">
+  <p:cSld>
+    <p:spTree>
+      <p:nvGrpSpPr>
+        <p:cNvPr id="1" name=""/>
+        <p:cNvGrpSpPr/>
+        <p:nvPr/>
+      </p:nvGrpSpPr>
+      <p:grpSpPr>
+        <a:xfrm>
+          <a:off x="0" y="0"/>
+          <a:ext cx="0" cy="0"/>
+          <a:chOff x="0" y="0"/>
+          <a:chExt cx="0" cy="0"/>
+        </a:xfrm>
+      </p:grpSpPr>
+      <p:sp>
+        <p:nvSpPr>
           <p:cNvPr id="164" name="PlaceHolder 1"/>
           <p:cNvSpPr>
             <a:spLocks noGrp="1"/>
@@ -4727,7 +4844,7 @@
 </p:sld>
 </file>
 
-<file path=ppt/slides/slide17.xml><?xml version="1.0" encoding="utf-8"?>
+<file path=ppt/slides/slide18.xml><?xml version="1.0" encoding="utf-8"?>
 <p:sld xmlns:a="http://schemas.openxmlformats.org/drawingml/2006/main" xmlns:r="http://schemas.openxmlformats.org/officeDocument/2006/relationships" xmlns:p="http://schemas.openxmlformats.org/presentationml/2006/main">
   <p:cSld>
     <p:spTree>
@@ -4973,7 +5090,7 @@
 </p:sld>
 </file>
 
-<file path=ppt/slides/slide18.xml><?xml version="1.0" encoding="utf-8"?>
+<file path=ppt/slides/slide19.xml><?xml version="1.0" encoding="utf-8"?>
 <p:sld xmlns:a="http://schemas.openxmlformats.org/drawingml/2006/main" xmlns:r="http://schemas.openxmlformats.org/officeDocument/2006/relationships" xmlns:p="http://schemas.openxmlformats.org/presentationml/2006/main">
   <p:cSld>
     <p:spTree>
@@ -5290,336 +5407,6 @@
 </p:sld>
 </file>
 
-<file path=ppt/slides/slide19.xml><?xml version="1.0" encoding="utf-8"?>
-<p:sld xmlns:a="http://schemas.openxmlformats.org/drawingml/2006/main" xmlns:r="http://schemas.openxmlformats.org/officeDocument/2006/relationships" xmlns:p="http://schemas.openxmlformats.org/presentationml/2006/main">
-  <p:cSld>
-    <p:spTree>
-      <p:nvGrpSpPr>
-        <p:cNvPr id="1" name=""/>
-        <p:cNvGrpSpPr/>
-        <p:nvPr/>
-      </p:nvGrpSpPr>
-      <p:grpSpPr>
-        <a:xfrm>
-          <a:off x="0" y="0"/>
-          <a:ext cx="0" cy="0"/>
-          <a:chOff x="0" y="0"/>
-          <a:chExt cx="0" cy="0"/>
-        </a:xfrm>
-      </p:grpSpPr>
-      <p:sp>
-        <p:nvSpPr>
-          <p:cNvPr id="174" name="PlaceHolder 1"/>
-          <p:cNvSpPr>
-            <a:spLocks noGrp="1"/>
-          </p:cNvSpPr>
-          <p:nvPr>
-            <p:ph type="title"/>
-          </p:nvPr>
-        </p:nvSpPr>
-        <p:spPr>
-          <a:xfrm>
-            <a:off x="609480" y="273600"/>
-            <a:ext cx="10968480" cy="1140840"/>
-          </a:xfrm>
-          <a:prstGeom prst="rect">
-            <a:avLst/>
-          </a:prstGeom>
-          <a:noFill/>
-          <a:ln w="0">
-            <a:noFill/>
-          </a:ln>
-        </p:spPr>
-        <p:txBody>
-          <a:bodyPr lIns="0" tIns="0" rIns="0" bIns="0" anchor="ctr">
-            <a:noAutofit/>
-          </a:bodyPr>
-          <a:lstStyle/>
-          <a:p>
-            <a:pPr>
-              <a:lnSpc>
-                <a:spcPct val="100000"/>
-              </a:lnSpc>
-              <a:buNone/>
-            </a:pPr>
-            <a:r>
-              <a:rPr lang="en-IE" sz="4400" b="1" strike="noStrike" spc="-1" dirty="0"/>
-              <a:t>Data Gathering - User</a:t>
-            </a:r>
-          </a:p>
-        </p:txBody>
-      </p:sp>
-      <p:sp>
-        <p:nvSpPr>
-          <p:cNvPr id="175" name="Rectangle 174"/>
-          <p:cNvSpPr/>
-          <p:nvPr/>
-        </p:nvSpPr>
-        <p:spPr>
-          <a:xfrm>
-            <a:off x="515520" y="1414440"/>
-            <a:ext cx="11156400" cy="1878480"/>
-          </a:xfrm>
-          <a:prstGeom prst="rect">
-            <a:avLst/>
-          </a:prstGeom>
-          <a:noFill/>
-          <a:ln w="0">
-            <a:noFill/>
-          </a:ln>
-        </p:spPr>
-        <p:style>
-          <a:lnRef idx="0">
-            <a:scrgbClr r="0" g="0" b="0"/>
-          </a:lnRef>
-          <a:fillRef idx="0">
-            <a:scrgbClr r="0" g="0" b="0"/>
-          </a:fillRef>
-          <a:effectRef idx="0">
-            <a:scrgbClr r="0" g="0" b="0"/>
-          </a:effectRef>
-          <a:fontRef idx="minor"/>
-        </p:style>
-        <p:txBody>
-          <a:bodyPr lIns="90000" tIns="45000" rIns="90000" bIns="45000" anchor="t">
-            <a:noAutofit/>
-          </a:bodyPr>
-          <a:lstStyle/>
-          <a:p>
-            <a:pPr>
-              <a:lnSpc>
-                <a:spcPct val="100000"/>
-              </a:lnSpc>
-              <a:buNone/>
-            </a:pPr>
-            <a:r>
-              <a:rPr lang="en-IE" sz="2400" b="0" strike="noStrike" spc="-1" dirty="0">
-                <a:solidFill>
-                  <a:srgbClr val="000000"/>
-                </a:solidFill>
-                <a:ea typeface="DejaVu Sans"/>
-              </a:rPr>
-              <a:t>User Data</a:t>
-            </a:r>
-            <a:endParaRPr lang="en-IE" sz="2400" b="0" strike="noStrike" spc="-1" dirty="0"/>
-          </a:p>
-          <a:p>
-            <a:pPr>
-              <a:lnSpc>
-                <a:spcPct val="100000"/>
-              </a:lnSpc>
-              <a:buNone/>
-            </a:pPr>
-            <a:r>
-              <a:rPr lang="en-IE" sz="2400" b="0" strike="noStrike" spc="-1" dirty="0">
-                <a:solidFill>
-                  <a:srgbClr val="000000"/>
-                </a:solidFill>
-                <a:ea typeface="DejaVu Sans"/>
-              </a:rPr>
-              <a:t>	- User email</a:t>
-            </a:r>
-            <a:endParaRPr lang="en-IE" sz="2400" b="0" strike="noStrike" spc="-1" dirty="0"/>
-          </a:p>
-          <a:p>
-            <a:pPr>
-              <a:lnSpc>
-                <a:spcPct val="100000"/>
-              </a:lnSpc>
-              <a:buNone/>
-            </a:pPr>
-            <a:r>
-              <a:rPr lang="en-IE" sz="2400" b="0" strike="noStrike" spc="-1" dirty="0">
-                <a:solidFill>
-                  <a:srgbClr val="000000"/>
-                </a:solidFill>
-                <a:ea typeface="DejaVu Sans"/>
-              </a:rPr>
-              <a:t>	- Password</a:t>
-            </a:r>
-            <a:endParaRPr lang="en-IE" sz="2400" b="0" strike="noStrike" spc="-1" dirty="0"/>
-          </a:p>
-          <a:p>
-            <a:pPr>
-              <a:lnSpc>
-                <a:spcPct val="100000"/>
-              </a:lnSpc>
-              <a:buNone/>
-            </a:pPr>
-            <a:r>
-              <a:rPr lang="en-IE" sz="2400" b="0" strike="noStrike" spc="-1" dirty="0">
-                <a:solidFill>
-                  <a:srgbClr val="000000"/>
-                </a:solidFill>
-                <a:ea typeface="DejaVu Sans"/>
-              </a:rPr>
-              <a:t>	- This will be used to create a user account</a:t>
-            </a:r>
-            <a:endParaRPr lang="en-IE" sz="2400" b="0" strike="noStrike" spc="-1" dirty="0"/>
-          </a:p>
-          <a:p>
-            <a:pPr>
-              <a:lnSpc>
-                <a:spcPct val="100000"/>
-              </a:lnSpc>
-              <a:buNone/>
-            </a:pPr>
-            <a:endParaRPr lang="en-IE" sz="2400" b="0" strike="noStrike" spc="-1" dirty="0"/>
-          </a:p>
-          <a:p>
-            <a:pPr>
-              <a:lnSpc>
-                <a:spcPct val="100000"/>
-              </a:lnSpc>
-              <a:buNone/>
-            </a:pPr>
-            <a:r>
-              <a:rPr lang="en-IE" sz="2400" b="0" strike="noStrike" spc="-1" dirty="0">
-                <a:solidFill>
-                  <a:srgbClr val="000000"/>
-                </a:solidFill>
-                <a:ea typeface="DejaVu Sans"/>
-              </a:rPr>
-              <a:t>Medication</a:t>
-            </a:r>
-            <a:endParaRPr lang="en-IE" sz="2400" b="0" strike="noStrike" spc="-1" dirty="0"/>
-          </a:p>
-          <a:p>
-            <a:pPr>
-              <a:lnSpc>
-                <a:spcPct val="100000"/>
-              </a:lnSpc>
-              <a:buNone/>
-            </a:pPr>
-            <a:r>
-              <a:rPr lang="en-IE" sz="2400" b="0" strike="noStrike" spc="-1" dirty="0">
-                <a:solidFill>
-                  <a:srgbClr val="000000"/>
-                </a:solidFill>
-                <a:ea typeface="DejaVu Sans"/>
-              </a:rPr>
-              <a:t>	- Medication details</a:t>
-            </a:r>
-            <a:endParaRPr lang="en-IE" sz="2400" b="0" strike="noStrike" spc="-1" dirty="0"/>
-          </a:p>
-          <a:p>
-            <a:pPr>
-              <a:lnSpc>
-                <a:spcPct val="100000"/>
-              </a:lnSpc>
-              <a:buNone/>
-            </a:pPr>
-            <a:r>
-              <a:rPr lang="en-IE" sz="2400" b="0" strike="noStrike" spc="-1" dirty="0">
-                <a:solidFill>
-                  <a:srgbClr val="000000"/>
-                </a:solidFill>
-                <a:ea typeface="DejaVu Sans"/>
-              </a:rPr>
-              <a:t>	- This will be used to assist in refilling the boxes and to create medication histories</a:t>
-            </a:r>
-            <a:endParaRPr lang="en-IE" sz="2400" b="0" strike="noStrike" spc="-1" dirty="0"/>
-          </a:p>
-          <a:p>
-            <a:pPr>
-              <a:lnSpc>
-                <a:spcPct val="100000"/>
-              </a:lnSpc>
-              <a:buNone/>
-            </a:pPr>
-            <a:endParaRPr lang="en-IE" sz="2400" b="0" strike="noStrike" spc="-1" dirty="0"/>
-          </a:p>
-          <a:p>
-            <a:pPr>
-              <a:lnSpc>
-                <a:spcPct val="100000"/>
-              </a:lnSpc>
-              <a:buNone/>
-            </a:pPr>
-            <a:r>
-              <a:rPr lang="en-IE" sz="2400" b="0" strike="noStrike" spc="-1" dirty="0">
-                <a:solidFill>
-                  <a:srgbClr val="000000"/>
-                </a:solidFill>
-                <a:ea typeface="DejaVu Sans"/>
-              </a:rPr>
-              <a:t>Time</a:t>
-            </a:r>
-            <a:endParaRPr lang="en-IE" sz="2400" b="0" strike="noStrike" spc="-1" dirty="0"/>
-          </a:p>
-          <a:p>
-            <a:pPr>
-              <a:lnSpc>
-                <a:spcPct val="100000"/>
-              </a:lnSpc>
-              <a:buNone/>
-            </a:pPr>
-            <a:r>
-              <a:rPr lang="en-IE" sz="2400" b="0" strike="noStrike" spc="-1" dirty="0">
-                <a:solidFill>
-                  <a:srgbClr val="000000"/>
-                </a:solidFill>
-                <a:ea typeface="DejaVu Sans"/>
-              </a:rPr>
-              <a:t>	- To send notifications</a:t>
-            </a:r>
-            <a:endParaRPr lang="en-IE" sz="2400" b="0" strike="noStrike" spc="-1" dirty="0"/>
-          </a:p>
-          <a:p>
-            <a:pPr>
-              <a:lnSpc>
-                <a:spcPct val="100000"/>
-              </a:lnSpc>
-              <a:buNone/>
-            </a:pPr>
-            <a:r>
-              <a:rPr lang="en-IE" sz="2400" b="0" strike="noStrike" spc="-1" dirty="0">
-                <a:solidFill>
-                  <a:srgbClr val="000000"/>
-                </a:solidFill>
-                <a:ea typeface="DejaVu Sans"/>
-              </a:rPr>
-              <a:t>	- To see when a box was opened</a:t>
-            </a:r>
-            <a:endParaRPr lang="en-IE" sz="2400" b="0" strike="noStrike" spc="-1" dirty="0"/>
-          </a:p>
-          <a:p>
-            <a:pPr>
-              <a:lnSpc>
-                <a:spcPct val="100000"/>
-              </a:lnSpc>
-              <a:buNone/>
-            </a:pPr>
-            <a:r>
-              <a:rPr lang="en-IE" sz="2400" b="0" strike="noStrike" spc="-1" dirty="0">
-                <a:solidFill>
-                  <a:srgbClr val="000000"/>
-                </a:solidFill>
-                <a:ea typeface="DejaVu Sans"/>
-              </a:rPr>
-              <a:t>	- To record missed </a:t>
-            </a:r>
-            <a:r>
-              <a:rPr lang="en-IE" sz="2400" b="0" strike="noStrike" spc="-1" dirty="0" err="1">
-                <a:solidFill>
-                  <a:srgbClr val="000000"/>
-                </a:solidFill>
-                <a:ea typeface="DejaVu Sans"/>
-              </a:rPr>
-              <a:t>doeses</a:t>
-            </a:r>
-            <a:endParaRPr lang="en-IE" sz="2400" b="0" strike="noStrike" spc="-1" dirty="0"/>
-          </a:p>
-        </p:txBody>
-      </p:sp>
-    </p:spTree>
-  </p:cSld>
-  <p:clrMapOvr>
-    <a:masterClrMapping/>
-  </p:clrMapOvr>
-</p:sld>
-</file>
-
 <file path=ppt/slides/slide2.xml><?xml version="1.0" encoding="utf-8"?>
 <p:sld xmlns:a="http://schemas.openxmlformats.org/drawingml/2006/main" xmlns:r="http://schemas.openxmlformats.org/officeDocument/2006/relationships" xmlns:p="http://schemas.openxmlformats.org/presentationml/2006/main">
   <p:cSld>
@@ -6125,6 +5912,336 @@
       </p:grpSpPr>
       <p:sp>
         <p:nvSpPr>
+          <p:cNvPr id="174" name="PlaceHolder 1"/>
+          <p:cNvSpPr>
+            <a:spLocks noGrp="1"/>
+          </p:cNvSpPr>
+          <p:nvPr>
+            <p:ph type="title"/>
+          </p:nvPr>
+        </p:nvSpPr>
+        <p:spPr>
+          <a:xfrm>
+            <a:off x="609480" y="273600"/>
+            <a:ext cx="10968480" cy="1140840"/>
+          </a:xfrm>
+          <a:prstGeom prst="rect">
+            <a:avLst/>
+          </a:prstGeom>
+          <a:noFill/>
+          <a:ln w="0">
+            <a:noFill/>
+          </a:ln>
+        </p:spPr>
+        <p:txBody>
+          <a:bodyPr lIns="0" tIns="0" rIns="0" bIns="0" anchor="ctr">
+            <a:noAutofit/>
+          </a:bodyPr>
+          <a:lstStyle/>
+          <a:p>
+            <a:pPr>
+              <a:lnSpc>
+                <a:spcPct val="100000"/>
+              </a:lnSpc>
+              <a:buNone/>
+            </a:pPr>
+            <a:r>
+              <a:rPr lang="en-IE" sz="4400" b="1" strike="noStrike" spc="-1" dirty="0"/>
+              <a:t>Data Gathering - User</a:t>
+            </a:r>
+          </a:p>
+        </p:txBody>
+      </p:sp>
+      <p:sp>
+        <p:nvSpPr>
+          <p:cNvPr id="175" name="Rectangle 174"/>
+          <p:cNvSpPr/>
+          <p:nvPr/>
+        </p:nvSpPr>
+        <p:spPr>
+          <a:xfrm>
+            <a:off x="515520" y="1414440"/>
+            <a:ext cx="11156400" cy="1878480"/>
+          </a:xfrm>
+          <a:prstGeom prst="rect">
+            <a:avLst/>
+          </a:prstGeom>
+          <a:noFill/>
+          <a:ln w="0">
+            <a:noFill/>
+          </a:ln>
+        </p:spPr>
+        <p:style>
+          <a:lnRef idx="0">
+            <a:scrgbClr r="0" g="0" b="0"/>
+          </a:lnRef>
+          <a:fillRef idx="0">
+            <a:scrgbClr r="0" g="0" b="0"/>
+          </a:fillRef>
+          <a:effectRef idx="0">
+            <a:scrgbClr r="0" g="0" b="0"/>
+          </a:effectRef>
+          <a:fontRef idx="minor"/>
+        </p:style>
+        <p:txBody>
+          <a:bodyPr lIns="90000" tIns="45000" rIns="90000" bIns="45000" anchor="t">
+            <a:noAutofit/>
+          </a:bodyPr>
+          <a:lstStyle/>
+          <a:p>
+            <a:pPr>
+              <a:lnSpc>
+                <a:spcPct val="100000"/>
+              </a:lnSpc>
+              <a:buNone/>
+            </a:pPr>
+            <a:r>
+              <a:rPr lang="en-IE" sz="2400" b="0" strike="noStrike" spc="-1" dirty="0">
+                <a:solidFill>
+                  <a:srgbClr val="000000"/>
+                </a:solidFill>
+                <a:ea typeface="DejaVu Sans"/>
+              </a:rPr>
+              <a:t>User Data</a:t>
+            </a:r>
+            <a:endParaRPr lang="en-IE" sz="2400" b="0" strike="noStrike" spc="-1" dirty="0"/>
+          </a:p>
+          <a:p>
+            <a:pPr>
+              <a:lnSpc>
+                <a:spcPct val="100000"/>
+              </a:lnSpc>
+              <a:buNone/>
+            </a:pPr>
+            <a:r>
+              <a:rPr lang="en-IE" sz="2400" b="0" strike="noStrike" spc="-1" dirty="0">
+                <a:solidFill>
+                  <a:srgbClr val="000000"/>
+                </a:solidFill>
+                <a:ea typeface="DejaVu Sans"/>
+              </a:rPr>
+              <a:t>	- User email</a:t>
+            </a:r>
+            <a:endParaRPr lang="en-IE" sz="2400" b="0" strike="noStrike" spc="-1" dirty="0"/>
+          </a:p>
+          <a:p>
+            <a:pPr>
+              <a:lnSpc>
+                <a:spcPct val="100000"/>
+              </a:lnSpc>
+              <a:buNone/>
+            </a:pPr>
+            <a:r>
+              <a:rPr lang="en-IE" sz="2400" b="0" strike="noStrike" spc="-1" dirty="0">
+                <a:solidFill>
+                  <a:srgbClr val="000000"/>
+                </a:solidFill>
+                <a:ea typeface="DejaVu Sans"/>
+              </a:rPr>
+              <a:t>	- Password</a:t>
+            </a:r>
+            <a:endParaRPr lang="en-IE" sz="2400" b="0" strike="noStrike" spc="-1" dirty="0"/>
+          </a:p>
+          <a:p>
+            <a:pPr>
+              <a:lnSpc>
+                <a:spcPct val="100000"/>
+              </a:lnSpc>
+              <a:buNone/>
+            </a:pPr>
+            <a:r>
+              <a:rPr lang="en-IE" sz="2400" b="0" strike="noStrike" spc="-1" dirty="0">
+                <a:solidFill>
+                  <a:srgbClr val="000000"/>
+                </a:solidFill>
+                <a:ea typeface="DejaVu Sans"/>
+              </a:rPr>
+              <a:t>	- This will be used to create a user account</a:t>
+            </a:r>
+            <a:endParaRPr lang="en-IE" sz="2400" b="0" strike="noStrike" spc="-1" dirty="0"/>
+          </a:p>
+          <a:p>
+            <a:pPr>
+              <a:lnSpc>
+                <a:spcPct val="100000"/>
+              </a:lnSpc>
+              <a:buNone/>
+            </a:pPr>
+            <a:endParaRPr lang="en-IE" sz="2400" b="0" strike="noStrike" spc="-1" dirty="0"/>
+          </a:p>
+          <a:p>
+            <a:pPr>
+              <a:lnSpc>
+                <a:spcPct val="100000"/>
+              </a:lnSpc>
+              <a:buNone/>
+            </a:pPr>
+            <a:r>
+              <a:rPr lang="en-IE" sz="2400" b="0" strike="noStrike" spc="-1" dirty="0">
+                <a:solidFill>
+                  <a:srgbClr val="000000"/>
+                </a:solidFill>
+                <a:ea typeface="DejaVu Sans"/>
+              </a:rPr>
+              <a:t>Medication</a:t>
+            </a:r>
+            <a:endParaRPr lang="en-IE" sz="2400" b="0" strike="noStrike" spc="-1" dirty="0"/>
+          </a:p>
+          <a:p>
+            <a:pPr>
+              <a:lnSpc>
+                <a:spcPct val="100000"/>
+              </a:lnSpc>
+              <a:buNone/>
+            </a:pPr>
+            <a:r>
+              <a:rPr lang="en-IE" sz="2400" b="0" strike="noStrike" spc="-1" dirty="0">
+                <a:solidFill>
+                  <a:srgbClr val="000000"/>
+                </a:solidFill>
+                <a:ea typeface="DejaVu Sans"/>
+              </a:rPr>
+              <a:t>	- Medication details</a:t>
+            </a:r>
+            <a:endParaRPr lang="en-IE" sz="2400" b="0" strike="noStrike" spc="-1" dirty="0"/>
+          </a:p>
+          <a:p>
+            <a:pPr>
+              <a:lnSpc>
+                <a:spcPct val="100000"/>
+              </a:lnSpc>
+              <a:buNone/>
+            </a:pPr>
+            <a:r>
+              <a:rPr lang="en-IE" sz="2400" b="0" strike="noStrike" spc="-1" dirty="0">
+                <a:solidFill>
+                  <a:srgbClr val="000000"/>
+                </a:solidFill>
+                <a:ea typeface="DejaVu Sans"/>
+              </a:rPr>
+              <a:t>	- This will be used to assist in refilling the boxes and to create medication histories</a:t>
+            </a:r>
+            <a:endParaRPr lang="en-IE" sz="2400" b="0" strike="noStrike" spc="-1" dirty="0"/>
+          </a:p>
+          <a:p>
+            <a:pPr>
+              <a:lnSpc>
+                <a:spcPct val="100000"/>
+              </a:lnSpc>
+              <a:buNone/>
+            </a:pPr>
+            <a:endParaRPr lang="en-IE" sz="2400" b="0" strike="noStrike" spc="-1" dirty="0"/>
+          </a:p>
+          <a:p>
+            <a:pPr>
+              <a:lnSpc>
+                <a:spcPct val="100000"/>
+              </a:lnSpc>
+              <a:buNone/>
+            </a:pPr>
+            <a:r>
+              <a:rPr lang="en-IE" sz="2400" b="0" strike="noStrike" spc="-1" dirty="0">
+                <a:solidFill>
+                  <a:srgbClr val="000000"/>
+                </a:solidFill>
+                <a:ea typeface="DejaVu Sans"/>
+              </a:rPr>
+              <a:t>Time</a:t>
+            </a:r>
+            <a:endParaRPr lang="en-IE" sz="2400" b="0" strike="noStrike" spc="-1" dirty="0"/>
+          </a:p>
+          <a:p>
+            <a:pPr>
+              <a:lnSpc>
+                <a:spcPct val="100000"/>
+              </a:lnSpc>
+              <a:buNone/>
+            </a:pPr>
+            <a:r>
+              <a:rPr lang="en-IE" sz="2400" b="0" strike="noStrike" spc="-1" dirty="0">
+                <a:solidFill>
+                  <a:srgbClr val="000000"/>
+                </a:solidFill>
+                <a:ea typeface="DejaVu Sans"/>
+              </a:rPr>
+              <a:t>	- To send notifications</a:t>
+            </a:r>
+            <a:endParaRPr lang="en-IE" sz="2400" b="0" strike="noStrike" spc="-1" dirty="0"/>
+          </a:p>
+          <a:p>
+            <a:pPr>
+              <a:lnSpc>
+                <a:spcPct val="100000"/>
+              </a:lnSpc>
+              <a:buNone/>
+            </a:pPr>
+            <a:r>
+              <a:rPr lang="en-IE" sz="2400" b="0" strike="noStrike" spc="-1" dirty="0">
+                <a:solidFill>
+                  <a:srgbClr val="000000"/>
+                </a:solidFill>
+                <a:ea typeface="DejaVu Sans"/>
+              </a:rPr>
+              <a:t>	- To see when a box was opened</a:t>
+            </a:r>
+            <a:endParaRPr lang="en-IE" sz="2400" b="0" strike="noStrike" spc="-1" dirty="0"/>
+          </a:p>
+          <a:p>
+            <a:pPr>
+              <a:lnSpc>
+                <a:spcPct val="100000"/>
+              </a:lnSpc>
+              <a:buNone/>
+            </a:pPr>
+            <a:r>
+              <a:rPr lang="en-IE" sz="2400" b="0" strike="noStrike" spc="-1" dirty="0">
+                <a:solidFill>
+                  <a:srgbClr val="000000"/>
+                </a:solidFill>
+                <a:ea typeface="DejaVu Sans"/>
+              </a:rPr>
+              <a:t>	- To record missed </a:t>
+            </a:r>
+            <a:r>
+              <a:rPr lang="en-IE" sz="2400" b="0" strike="noStrike" spc="-1" dirty="0" err="1">
+                <a:solidFill>
+                  <a:srgbClr val="000000"/>
+                </a:solidFill>
+                <a:ea typeface="DejaVu Sans"/>
+              </a:rPr>
+              <a:t>doeses</a:t>
+            </a:r>
+            <a:endParaRPr lang="en-IE" sz="2400" b="0" strike="noStrike" spc="-1" dirty="0"/>
+          </a:p>
+        </p:txBody>
+      </p:sp>
+    </p:spTree>
+  </p:cSld>
+  <p:clrMapOvr>
+    <a:masterClrMapping/>
+  </p:clrMapOvr>
+</p:sld>
+</file>
+
+<file path=ppt/slides/slide21.xml><?xml version="1.0" encoding="utf-8"?>
+<p:sld xmlns:a="http://schemas.openxmlformats.org/drawingml/2006/main" xmlns:r="http://schemas.openxmlformats.org/officeDocument/2006/relationships" xmlns:p="http://schemas.openxmlformats.org/presentationml/2006/main">
+  <p:cSld>
+    <p:spTree>
+      <p:nvGrpSpPr>
+        <p:cNvPr id="1" name=""/>
+        <p:cNvGrpSpPr/>
+        <p:nvPr/>
+      </p:nvGrpSpPr>
+      <p:grpSpPr>
+        <a:xfrm>
+          <a:off x="0" y="0"/>
+          <a:ext cx="0" cy="0"/>
+          <a:chOff x="0" y="0"/>
+          <a:chExt cx="0" cy="0"/>
+        </a:xfrm>
+      </p:grpSpPr>
+      <p:sp>
+        <p:nvSpPr>
           <p:cNvPr id="176" name="PlaceHolder 1"/>
           <p:cNvSpPr>
             <a:spLocks noGrp="1"/>
@@ -6348,7 +6465,7 @@
 </p:sld>
 </file>
 
-<file path=ppt/slides/slide21.xml><?xml version="1.0" encoding="utf-8"?>
+<file path=ppt/slides/slide22.xml><?xml version="1.0" encoding="utf-8"?>
 <p:sld xmlns:a="http://schemas.openxmlformats.org/drawingml/2006/main" xmlns:r="http://schemas.openxmlformats.org/officeDocument/2006/relationships" xmlns:p="http://schemas.openxmlformats.org/presentationml/2006/main">
   <p:cSld>
     <p:spTree>
@@ -6577,7 +6694,7 @@
 </p:sld>
 </file>
 
-<file path=ppt/slides/slide22.xml><?xml version="1.0" encoding="utf-8"?>
+<file path=ppt/slides/slide23.xml><?xml version="1.0" encoding="utf-8"?>
 <p:sld xmlns:a="http://schemas.openxmlformats.org/drawingml/2006/main" xmlns:r="http://schemas.openxmlformats.org/officeDocument/2006/relationships" xmlns:p="http://schemas.openxmlformats.org/presentationml/2006/main">
   <p:cSld>
     <p:spTree>
@@ -6835,7 +6952,7 @@
 </p:sld>
 </file>
 
-<file path=ppt/slides/slide23.xml><?xml version="1.0" encoding="utf-8"?>
+<file path=ppt/slides/slide24.xml><?xml version="1.0" encoding="utf-8"?>
 <p:sld xmlns:a="http://schemas.openxmlformats.org/drawingml/2006/main" xmlns:r="http://schemas.openxmlformats.org/officeDocument/2006/relationships" xmlns:p="http://schemas.openxmlformats.org/presentationml/2006/main">
   <p:cSld>
     <p:spTree>
@@ -6944,7 +7061,7 @@
 </p:sld>
 </file>
 
-<file path=ppt/slides/slide24.xml><?xml version="1.0" encoding="utf-8"?>
+<file path=ppt/slides/slide25.xml><?xml version="1.0" encoding="utf-8"?>
 <p:sld xmlns:a="http://schemas.openxmlformats.org/drawingml/2006/main" xmlns:r="http://schemas.openxmlformats.org/officeDocument/2006/relationships" xmlns:p="http://schemas.openxmlformats.org/presentationml/2006/main">
   <p:cSld>
     <p:spTree>
@@ -7300,7 +7417,7 @@
 </p:sld>
 </file>
 
-<file path=ppt/slides/slide25.xml><?xml version="1.0" encoding="utf-8"?>
+<file path=ppt/slides/slide26.xml><?xml version="1.0" encoding="utf-8"?>
 <p:sld xmlns:a="http://schemas.openxmlformats.org/drawingml/2006/main" xmlns:r="http://schemas.openxmlformats.org/officeDocument/2006/relationships" xmlns:p="http://schemas.openxmlformats.org/presentationml/2006/main">
   <p:cSld>
     <p:spTree>

</xml_diff>